<commit_message>
Add images and latest slides
</commit_message>
<xml_diff>
--- a/ucn presentation 7-9.pptx
+++ b/ucn presentation 7-9.pptx
@@ -5,16 +5,23 @@
     <p:sldMasterId id="2147483648" r:id="rId1"/>
   </p:sldMasterIdLst>
   <p:notesMasterIdLst>
-    <p:notesMasterId r:id="rId9"/>
+    <p:notesMasterId r:id="rId16"/>
   </p:notesMasterIdLst>
   <p:sldIdLst>
-    <p:sldId id="261" r:id="rId2"/>
-    <p:sldId id="258" r:id="rId3"/>
-    <p:sldId id="256" r:id="rId4"/>
-    <p:sldId id="259" r:id="rId5"/>
-    <p:sldId id="260" r:id="rId6"/>
-    <p:sldId id="257" r:id="rId7"/>
-    <p:sldId id="262" r:id="rId8"/>
+    <p:sldId id="270" r:id="rId2"/>
+    <p:sldId id="266" r:id="rId3"/>
+    <p:sldId id="267" r:id="rId4"/>
+    <p:sldId id="261" r:id="rId5"/>
+    <p:sldId id="258" r:id="rId6"/>
+    <p:sldId id="256" r:id="rId7"/>
+    <p:sldId id="259" r:id="rId8"/>
+    <p:sldId id="268" r:id="rId9"/>
+    <p:sldId id="260" r:id="rId10"/>
+    <p:sldId id="269" r:id="rId11"/>
+    <p:sldId id="257" r:id="rId12"/>
+    <p:sldId id="262" r:id="rId13"/>
+    <p:sldId id="263" r:id="rId14"/>
+    <p:sldId id="265" r:id="rId15"/>
   </p:sldIdLst>
   <p:sldSz cx="12192000" cy="6858000"/>
   <p:notesSz cx="6858000" cy="9144000"/>
@@ -215,7 +222,7 @@
           <a:p>
             <a:fld id="{053EB616-2AE0-4EB9-B1A6-8579CD23964F}" type="datetimeFigureOut">
               <a:rPr lang="en-US" smtClean="0"/>
-              <a:t>7/30/2021</a:t>
+              <a:t>8/6/2021</a:t>
             </a:fld>
             <a:endParaRPr lang="en-US"/>
           </a:p>
@@ -547,7 +554,7 @@
           <a:p>
             <a:fld id="{0670F3B7-9ED9-4B1D-985E-DE786D906790}" type="slidenum">
               <a:rPr lang="en-US" smtClean="0"/>
-              <a:t>1</a:t>
+              <a:t>2</a:t>
             </a:fld>
             <a:endParaRPr lang="en-US"/>
           </a:p>
@@ -556,7 +563,7 @@
     </p:spTree>
     <p:extLst>
       <p:ext uri="{BB962C8B-B14F-4D97-AF65-F5344CB8AC3E}">
-        <p14:creationId xmlns:p14="http://schemas.microsoft.com/office/powerpoint/2010/main" val="1538729256"/>
+        <p14:creationId xmlns:p14="http://schemas.microsoft.com/office/powerpoint/2010/main" val="4153571693"/>
       </p:ext>
     </p:extLst>
   </p:cSld>
@@ -631,7 +638,7 @@
           <a:p>
             <a:fld id="{0670F3B7-9ED9-4B1D-985E-DE786D906790}" type="slidenum">
               <a:rPr lang="en-US" smtClean="0"/>
-              <a:t>3</a:t>
+              <a:t>4</a:t>
             </a:fld>
             <a:endParaRPr lang="en-US"/>
           </a:p>
@@ -640,7 +647,7 @@
     </p:spTree>
     <p:extLst>
       <p:ext uri="{BB962C8B-B14F-4D97-AF65-F5344CB8AC3E}">
-        <p14:creationId xmlns:p14="http://schemas.microsoft.com/office/powerpoint/2010/main" val="3294205536"/>
+        <p14:creationId xmlns:p14="http://schemas.microsoft.com/office/powerpoint/2010/main" val="1538729256"/>
       </p:ext>
     </p:extLst>
   </p:cSld>
@@ -715,7 +722,7 @@
           <a:p>
             <a:fld id="{0670F3B7-9ED9-4B1D-985E-DE786D906790}" type="slidenum">
               <a:rPr lang="en-US" smtClean="0"/>
-              <a:t>4</a:t>
+              <a:t>6</a:t>
             </a:fld>
             <a:endParaRPr lang="en-US"/>
           </a:p>
@@ -724,7 +731,7 @@
     </p:spTree>
     <p:extLst>
       <p:ext uri="{BB962C8B-B14F-4D97-AF65-F5344CB8AC3E}">
-        <p14:creationId xmlns:p14="http://schemas.microsoft.com/office/powerpoint/2010/main" val="3886828388"/>
+        <p14:creationId xmlns:p14="http://schemas.microsoft.com/office/powerpoint/2010/main" val="3294205536"/>
       </p:ext>
     </p:extLst>
   </p:cSld>
@@ -799,7 +806,175 @@
           <a:p>
             <a:fld id="{0670F3B7-9ED9-4B1D-985E-DE786D906790}" type="slidenum">
               <a:rPr lang="en-US" smtClean="0"/>
-              <a:t>5</a:t>
+              <a:t>7</a:t>
+            </a:fld>
+            <a:endParaRPr lang="en-US"/>
+          </a:p>
+        </p:txBody>
+      </p:sp>
+    </p:spTree>
+    <p:extLst>
+      <p:ext uri="{BB962C8B-B14F-4D97-AF65-F5344CB8AC3E}">
+        <p14:creationId xmlns:p14="http://schemas.microsoft.com/office/powerpoint/2010/main" val="3886828388"/>
+      </p:ext>
+    </p:extLst>
+  </p:cSld>
+  <p:clrMapOvr>
+    <a:masterClrMapping/>
+  </p:clrMapOvr>
+</p:notes>
+</file>
+
+<file path=ppt/notesSlides/notesSlide5.xml><?xml version="1.0" encoding="utf-8"?>
+<p:notes xmlns:a="http://schemas.openxmlformats.org/drawingml/2006/main" xmlns:r="http://schemas.openxmlformats.org/officeDocument/2006/relationships" xmlns:p="http://schemas.openxmlformats.org/presentationml/2006/main">
+  <p:cSld>
+    <p:spTree>
+      <p:nvGrpSpPr>
+        <p:cNvPr id="1" name=""/>
+        <p:cNvGrpSpPr/>
+        <p:nvPr/>
+      </p:nvGrpSpPr>
+      <p:grpSpPr>
+        <a:xfrm>
+          <a:off x="0" y="0"/>
+          <a:ext cx="0" cy="0"/>
+          <a:chOff x="0" y="0"/>
+          <a:chExt cx="0" cy="0"/>
+        </a:xfrm>
+      </p:grpSpPr>
+      <p:sp>
+        <p:nvSpPr>
+          <p:cNvPr id="2" name="Slide Image Placeholder 1"/>
+          <p:cNvSpPr>
+            <a:spLocks noGrp="1" noRot="1" noChangeAspect="1"/>
+          </p:cNvSpPr>
+          <p:nvPr>
+            <p:ph type="sldImg"/>
+          </p:nvPr>
+        </p:nvSpPr>
+        <p:spPr/>
+      </p:sp>
+      <p:sp>
+        <p:nvSpPr>
+          <p:cNvPr id="3" name="Notes Placeholder 2"/>
+          <p:cNvSpPr>
+            <a:spLocks noGrp="1"/>
+          </p:cNvSpPr>
+          <p:nvPr>
+            <p:ph type="body" idx="1"/>
+          </p:nvPr>
+        </p:nvSpPr>
+        <p:spPr/>
+        <p:txBody>
+          <a:bodyPr/>
+          <a:lstStyle/>
+          <a:p>
+            <a:endParaRPr lang="en-US" dirty="0"/>
+          </a:p>
+        </p:txBody>
+      </p:sp>
+      <p:sp>
+        <p:nvSpPr>
+          <p:cNvPr id="4" name="Slide Number Placeholder 3"/>
+          <p:cNvSpPr>
+            <a:spLocks noGrp="1"/>
+          </p:cNvSpPr>
+          <p:nvPr>
+            <p:ph type="sldNum" sz="quarter" idx="5"/>
+          </p:nvPr>
+        </p:nvSpPr>
+        <p:spPr/>
+        <p:txBody>
+          <a:bodyPr/>
+          <a:lstStyle/>
+          <a:p>
+            <a:fld id="{0670F3B7-9ED9-4B1D-985E-DE786D906790}" type="slidenum">
+              <a:rPr lang="en-US" smtClean="0"/>
+              <a:t>8</a:t>
+            </a:fld>
+            <a:endParaRPr lang="en-US"/>
+          </a:p>
+        </p:txBody>
+      </p:sp>
+    </p:spTree>
+    <p:extLst>
+      <p:ext uri="{BB962C8B-B14F-4D97-AF65-F5344CB8AC3E}">
+        <p14:creationId xmlns:p14="http://schemas.microsoft.com/office/powerpoint/2010/main" val="1225076234"/>
+      </p:ext>
+    </p:extLst>
+  </p:cSld>
+  <p:clrMapOvr>
+    <a:masterClrMapping/>
+  </p:clrMapOvr>
+</p:notes>
+</file>
+
+<file path=ppt/notesSlides/notesSlide6.xml><?xml version="1.0" encoding="utf-8"?>
+<p:notes xmlns:a="http://schemas.openxmlformats.org/drawingml/2006/main" xmlns:r="http://schemas.openxmlformats.org/officeDocument/2006/relationships" xmlns:p="http://schemas.openxmlformats.org/presentationml/2006/main">
+  <p:cSld>
+    <p:spTree>
+      <p:nvGrpSpPr>
+        <p:cNvPr id="1" name=""/>
+        <p:cNvGrpSpPr/>
+        <p:nvPr/>
+      </p:nvGrpSpPr>
+      <p:grpSpPr>
+        <a:xfrm>
+          <a:off x="0" y="0"/>
+          <a:ext cx="0" cy="0"/>
+          <a:chOff x="0" y="0"/>
+          <a:chExt cx="0" cy="0"/>
+        </a:xfrm>
+      </p:grpSpPr>
+      <p:sp>
+        <p:nvSpPr>
+          <p:cNvPr id="2" name="Slide Image Placeholder 1"/>
+          <p:cNvSpPr>
+            <a:spLocks noGrp="1" noRot="1" noChangeAspect="1"/>
+          </p:cNvSpPr>
+          <p:nvPr>
+            <p:ph type="sldImg"/>
+          </p:nvPr>
+        </p:nvSpPr>
+        <p:spPr/>
+      </p:sp>
+      <p:sp>
+        <p:nvSpPr>
+          <p:cNvPr id="3" name="Notes Placeholder 2"/>
+          <p:cNvSpPr>
+            <a:spLocks noGrp="1"/>
+          </p:cNvSpPr>
+          <p:nvPr>
+            <p:ph type="body" idx="1"/>
+          </p:nvPr>
+        </p:nvSpPr>
+        <p:spPr/>
+        <p:txBody>
+          <a:bodyPr/>
+          <a:lstStyle/>
+          <a:p>
+            <a:endParaRPr lang="en-US" dirty="0"/>
+          </a:p>
+        </p:txBody>
+      </p:sp>
+      <p:sp>
+        <p:nvSpPr>
+          <p:cNvPr id="4" name="Slide Number Placeholder 3"/>
+          <p:cNvSpPr>
+            <a:spLocks noGrp="1"/>
+          </p:cNvSpPr>
+          <p:nvPr>
+            <p:ph type="sldNum" sz="quarter" idx="5"/>
+          </p:nvPr>
+        </p:nvSpPr>
+        <p:spPr/>
+        <p:txBody>
+          <a:bodyPr/>
+          <a:lstStyle/>
+          <a:p>
+            <a:fld id="{0670F3B7-9ED9-4B1D-985E-DE786D906790}" type="slidenum">
+              <a:rPr lang="en-US" smtClean="0"/>
+              <a:t>9</a:t>
             </a:fld>
             <a:endParaRPr lang="en-US"/>
           </a:p>
@@ -965,7 +1140,7 @@
           <a:p>
             <a:fld id="{A2300325-5372-4026-BB67-0B6405C4C3D1}" type="datetime1">
               <a:rPr lang="en-US" smtClean="0"/>
-              <a:t>7/30/2021</a:t>
+              <a:t>8/6/2021</a:t>
             </a:fld>
             <a:endParaRPr lang="en-US"/>
           </a:p>
@@ -1166,7 +1341,7 @@
           <a:p>
             <a:fld id="{B6667234-408D-4A48-A065-B037EA91A768}" type="datetime1">
               <a:rPr lang="en-US" smtClean="0"/>
-              <a:t>7/30/2021</a:t>
+              <a:t>8/6/2021</a:t>
             </a:fld>
             <a:endParaRPr lang="en-US"/>
           </a:p>
@@ -1377,7 +1552,7 @@
           <a:p>
             <a:fld id="{2E049F74-8A88-4439-9E43-2B7021E3ABCB}" type="datetime1">
               <a:rPr lang="en-US" smtClean="0"/>
-              <a:t>7/30/2021</a:t>
+              <a:t>8/6/2021</a:t>
             </a:fld>
             <a:endParaRPr lang="en-US"/>
           </a:p>
@@ -1578,7 +1753,7 @@
           <a:p>
             <a:fld id="{D2AA8B6C-32BB-4A9C-8BAB-5FE667751794}" type="datetime1">
               <a:rPr lang="en-US" smtClean="0"/>
-              <a:t>7/30/2021</a:t>
+              <a:t>8/6/2021</a:t>
             </a:fld>
             <a:endParaRPr lang="en-US"/>
           </a:p>
@@ -1856,7 +2031,7 @@
           <a:p>
             <a:fld id="{F7B709F6-0EE0-4A67-95D4-F317FE1A0D46}" type="datetime1">
               <a:rPr lang="en-US" smtClean="0"/>
-              <a:t>7/30/2021</a:t>
+              <a:t>8/6/2021</a:t>
             </a:fld>
             <a:endParaRPr lang="en-US"/>
           </a:p>
@@ -2124,7 +2299,7 @@
           <a:p>
             <a:fld id="{08002484-023F-455F-924A-4F87E55805DF}" type="datetime1">
               <a:rPr lang="en-US" smtClean="0"/>
-              <a:t>7/30/2021</a:t>
+              <a:t>8/6/2021</a:t>
             </a:fld>
             <a:endParaRPr lang="en-US"/>
           </a:p>
@@ -2539,7 +2714,7 @@
           <a:p>
             <a:fld id="{B71CB2DD-52AA-4F53-B7C2-BCE001999B66}" type="datetime1">
               <a:rPr lang="en-US" smtClean="0"/>
-              <a:t>7/30/2021</a:t>
+              <a:t>8/6/2021</a:t>
             </a:fld>
             <a:endParaRPr lang="en-US"/>
           </a:p>
@@ -2683,7 +2858,7 @@
           <a:p>
             <a:fld id="{4E805854-F662-4662-8C75-6E7A30AC749A}" type="datetime1">
               <a:rPr lang="en-US" smtClean="0"/>
-              <a:t>7/30/2021</a:t>
+              <a:t>8/6/2021</a:t>
             </a:fld>
             <a:endParaRPr lang="en-US"/>
           </a:p>
@@ -2799,7 +2974,7 @@
           <a:p>
             <a:fld id="{1AAF32DC-E2B7-446A-9500-6A930ABDB865}" type="datetime1">
               <a:rPr lang="en-US" smtClean="0"/>
-              <a:t>7/30/2021</a:t>
+              <a:t>8/6/2021</a:t>
             </a:fld>
             <a:endParaRPr lang="en-US"/>
           </a:p>
@@ -3113,7 +3288,7 @@
           <a:p>
             <a:fld id="{336E4A2B-DE0B-44CB-9209-C6DCE4735D18}" type="datetime1">
               <a:rPr lang="en-US" smtClean="0"/>
-              <a:t>7/30/2021</a:t>
+              <a:t>8/6/2021</a:t>
             </a:fld>
             <a:endParaRPr lang="en-US"/>
           </a:p>
@@ -3404,7 +3579,7 @@
           <a:p>
             <a:fld id="{4B1CCDF9-55DA-4DA8-B37D-E93B80915612}" type="datetime1">
               <a:rPr lang="en-US" smtClean="0"/>
-              <a:t>7/30/2021</a:t>
+              <a:t>8/6/2021</a:t>
             </a:fld>
             <a:endParaRPr lang="en-US"/>
           </a:p>
@@ -3648,7 +3823,7 @@
           <a:p>
             <a:fld id="{9D65BD36-0413-4751-9B94-AF919BCBADC2}" type="datetime1">
               <a:rPr lang="en-US" smtClean="0"/>
-              <a:t>7/30/2021</a:t>
+              <a:t>8/6/2021</a:t>
             </a:fld>
             <a:endParaRPr lang="en-US"/>
           </a:p>
@@ -4069,12 +4244,541 @@
           <a:chExt cx="0" cy="0"/>
         </a:xfrm>
       </p:grpSpPr>
+      <p:sp>
+        <p:nvSpPr>
+          <p:cNvPr id="2" name="Title 1">
+            <a:extLst>
+              <a:ext uri="{FF2B5EF4-FFF2-40B4-BE49-F238E27FC236}">
+                <a16:creationId xmlns:a16="http://schemas.microsoft.com/office/drawing/2014/main" id="{ADCDBCBB-701F-4410-9E9D-99AC2E5F399D}"/>
+              </a:ext>
+            </a:extLst>
+          </p:cNvPr>
+          <p:cNvSpPr>
+            <a:spLocks noGrp="1"/>
+          </p:cNvSpPr>
+          <p:nvPr>
+            <p:ph type="title"/>
+          </p:nvPr>
+        </p:nvSpPr>
+        <p:spPr/>
+        <p:txBody>
+          <a:bodyPr/>
+          <a:lstStyle/>
+          <a:p>
+            <a:r>
+              <a:rPr lang="en-US" dirty="0"/>
+              <a:t>P/T Experiment Classical Simulation</a:t>
+            </a:r>
+          </a:p>
+        </p:txBody>
+      </p:sp>
+      <p:sp>
+        <p:nvSpPr>
+          <p:cNvPr id="3" name="Content Placeholder 2">
+            <a:extLst>
+              <a:ext uri="{FF2B5EF4-FFF2-40B4-BE49-F238E27FC236}">
+                <a16:creationId xmlns:a16="http://schemas.microsoft.com/office/drawing/2014/main" id="{F244709D-15F1-45D6-A2A7-D311E22D3CC7}"/>
+              </a:ext>
+            </a:extLst>
+          </p:cNvPr>
+          <p:cNvSpPr>
+            <a:spLocks noGrp="1"/>
+          </p:cNvSpPr>
+          <p:nvPr>
+            <p:ph idx="1"/>
+          </p:nvPr>
+        </p:nvSpPr>
+        <p:spPr>
+          <a:xfrm>
+            <a:off x="838200" y="2884487"/>
+            <a:ext cx="10515600" cy="1089025"/>
+          </a:xfrm>
+        </p:spPr>
+        <p:txBody>
+          <a:bodyPr>
+            <a:normAutofit/>
+          </a:bodyPr>
+          <a:lstStyle/>
+          <a:p>
+            <a:r>
+              <a:rPr lang="en-US" dirty="0"/>
+              <a:t>By Jason Guo, advised by Professor </a:t>
+            </a:r>
+            <a:r>
+              <a:rPr lang="en-US" dirty="0" err="1"/>
+              <a:t>Filippone</a:t>
+            </a:r>
+            <a:endParaRPr lang="en-US" dirty="0"/>
+          </a:p>
+          <a:p>
+            <a:r>
+              <a:rPr lang="en-US" dirty="0"/>
+              <a:t>Code located at </a:t>
+            </a:r>
+            <a:r>
+              <a:rPr lang="en-US" dirty="0">
+                <a:hlinkClick r:id="rId2"/>
+              </a:rPr>
+              <a:t>https://github.com/erfz/pt-experiment</a:t>
+            </a:r>
+            <a:endParaRPr lang="en-US" dirty="0"/>
+          </a:p>
+        </p:txBody>
+      </p:sp>
+      <p:sp>
+        <p:nvSpPr>
+          <p:cNvPr id="4" name="Footer Placeholder 3">
+            <a:extLst>
+              <a:ext uri="{FF2B5EF4-FFF2-40B4-BE49-F238E27FC236}">
+                <a16:creationId xmlns:a16="http://schemas.microsoft.com/office/drawing/2014/main" id="{13AA0BFD-9C00-4307-AB6A-3BFDD0B7AE54}"/>
+              </a:ext>
+            </a:extLst>
+          </p:cNvPr>
+          <p:cNvSpPr>
+            <a:spLocks noGrp="1"/>
+          </p:cNvSpPr>
+          <p:nvPr>
+            <p:ph type="ftr" sz="quarter" idx="11"/>
+          </p:nvPr>
+        </p:nvSpPr>
+        <p:spPr/>
+        <p:txBody>
+          <a:bodyPr/>
+          <a:lstStyle/>
+          <a:p>
+            <a:r>
+              <a:rPr lang="en-US" dirty="0"/>
+              <a:t>https://github.com/erfz/pt-experiment</a:t>
+            </a:r>
+          </a:p>
+        </p:txBody>
+      </p:sp>
+      <p:sp>
+        <p:nvSpPr>
+          <p:cNvPr id="5" name="Slide Number Placeholder 4">
+            <a:extLst>
+              <a:ext uri="{FF2B5EF4-FFF2-40B4-BE49-F238E27FC236}">
+                <a16:creationId xmlns:a16="http://schemas.microsoft.com/office/drawing/2014/main" id="{7035EC7E-D82E-40AE-9520-7D902775B908}"/>
+              </a:ext>
+            </a:extLst>
+          </p:cNvPr>
+          <p:cNvSpPr>
+            <a:spLocks noGrp="1"/>
+          </p:cNvSpPr>
+          <p:nvPr>
+            <p:ph type="sldNum" sz="quarter" idx="12"/>
+          </p:nvPr>
+        </p:nvSpPr>
+        <p:spPr/>
+        <p:txBody>
+          <a:bodyPr/>
+          <a:lstStyle/>
+          <a:p>
+            <a:fld id="{92B06790-5D7A-46E6-89FE-8F323915C98E}" type="slidenum">
+              <a:rPr lang="en-US" smtClean="0"/>
+              <a:t>1</a:t>
+            </a:fld>
+            <a:endParaRPr lang="en-US"/>
+          </a:p>
+        </p:txBody>
+      </p:sp>
+    </p:spTree>
+    <p:extLst>
+      <p:ext uri="{BB962C8B-B14F-4D97-AF65-F5344CB8AC3E}">
+        <p14:creationId xmlns:p14="http://schemas.microsoft.com/office/powerpoint/2010/main" val="3906677549"/>
+      </p:ext>
+    </p:extLst>
+  </p:cSld>
+  <p:clrMapOvr>
+    <a:masterClrMapping/>
+  </p:clrMapOvr>
+</p:sld>
+</file>
+
+<file path=ppt/slides/slide10.xml><?xml version="1.0" encoding="utf-8"?>
+<p:sld xmlns:a="http://schemas.openxmlformats.org/drawingml/2006/main" xmlns:r="http://schemas.openxmlformats.org/officeDocument/2006/relationships" xmlns:p="http://schemas.openxmlformats.org/presentationml/2006/main">
+  <p:cSld>
+    <p:spTree>
+      <p:nvGrpSpPr>
+        <p:cNvPr id="1" name=""/>
+        <p:cNvGrpSpPr/>
+        <p:nvPr/>
+      </p:nvGrpSpPr>
+      <p:grpSpPr>
+        <a:xfrm>
+          <a:off x="0" y="0"/>
+          <a:ext cx="0" cy="0"/>
+          <a:chOff x="0" y="0"/>
+          <a:chExt cx="0" cy="0"/>
+        </a:xfrm>
+      </p:grpSpPr>
+      <p:sp>
+        <p:nvSpPr>
+          <p:cNvPr id="2" name="Title 1">
+            <a:extLst>
+              <a:ext uri="{FF2B5EF4-FFF2-40B4-BE49-F238E27FC236}">
+                <a16:creationId xmlns:a16="http://schemas.microsoft.com/office/drawing/2014/main" id="{ABA728EB-C5A7-4E72-B86D-94C08F8F4CAF}"/>
+              </a:ext>
+            </a:extLst>
+          </p:cNvPr>
+          <p:cNvSpPr>
+            <a:spLocks noGrp="1"/>
+          </p:cNvSpPr>
+          <p:nvPr>
+            <p:ph type="title"/>
+          </p:nvPr>
+        </p:nvSpPr>
+        <p:spPr/>
+        <p:txBody>
+          <a:bodyPr>
+            <a:normAutofit/>
+          </a:bodyPr>
+          <a:lstStyle/>
+          <a:p>
+            <a:r>
+              <a:rPr lang="en-US" sz="3200" dirty="0"/>
+              <a:t>Next Steps</a:t>
+            </a:r>
+          </a:p>
+        </p:txBody>
+      </p:sp>
+      <p:sp>
+        <p:nvSpPr>
+          <p:cNvPr id="3" name="Content Placeholder 2">
+            <a:extLst>
+              <a:ext uri="{FF2B5EF4-FFF2-40B4-BE49-F238E27FC236}">
+                <a16:creationId xmlns:a16="http://schemas.microsoft.com/office/drawing/2014/main" id="{E7739CE3-D52E-4945-815B-1CB906BA5F53}"/>
+              </a:ext>
+            </a:extLst>
+          </p:cNvPr>
+          <p:cNvSpPr>
+            <a:spLocks noGrp="1"/>
+          </p:cNvSpPr>
+          <p:nvPr>
+            <p:ph idx="1"/>
+          </p:nvPr>
+        </p:nvSpPr>
+        <p:spPr>
+          <a:xfrm>
+            <a:off x="838200" y="1847850"/>
+            <a:ext cx="10515600" cy="4351338"/>
+          </a:xfrm>
+        </p:spPr>
+        <p:txBody>
+          <a:bodyPr/>
+          <a:lstStyle/>
+          <a:p>
+            <a:r>
+              <a:rPr lang="en-US" dirty="0"/>
+              <a:t>Obtain sensible plots that show the relationships between:</a:t>
+            </a:r>
+          </a:p>
+          <a:p>
+            <a:pPr lvl="1"/>
+            <a:r>
+              <a:rPr lang="en-US" dirty="0"/>
+              <a:t>Average polarization vs saturation</a:t>
+            </a:r>
+          </a:p>
+          <a:p>
+            <a:pPr lvl="1"/>
+            <a:r>
+              <a:rPr lang="en-US" dirty="0"/>
+              <a:t>Average polarization vs domain dimensions</a:t>
+            </a:r>
+          </a:p>
+          <a:p>
+            <a:pPr lvl="1"/>
+            <a:r>
+              <a:rPr lang="en-US" dirty="0"/>
+              <a:t>Average polarization vs particle speed</a:t>
+            </a:r>
+          </a:p>
+          <a:p>
+            <a:r>
+              <a:rPr lang="en-US" dirty="0"/>
+              <a:t>Fully randomize magnetic field of unsaturated </a:t>
+            </a:r>
+            <a:r>
+              <a:rPr lang="en-US" dirty="0" err="1"/>
+              <a:t>Metglas</a:t>
+            </a:r>
+            <a:r>
+              <a:rPr lang="en-US" dirty="0"/>
+              <a:t> domains</a:t>
+            </a:r>
+          </a:p>
+          <a:p>
+            <a:r>
+              <a:rPr lang="en-US" dirty="0"/>
+              <a:t>Find more information on </a:t>
+            </a:r>
+            <a:r>
+              <a:rPr lang="en-US" dirty="0" err="1"/>
+              <a:t>Metglas</a:t>
+            </a:r>
+            <a:r>
+              <a:rPr lang="en-US" dirty="0"/>
+              <a:t> domain geometry and/or tune domain dimensions to match closely with experimental material data</a:t>
+            </a:r>
+          </a:p>
+          <a:p>
+            <a:r>
+              <a:rPr lang="en-US" dirty="0"/>
+              <a:t>Allow for cylindrical geometry of materials (currently all materials are rectangular prisms)</a:t>
+            </a:r>
+          </a:p>
+        </p:txBody>
+      </p:sp>
+      <p:sp>
+        <p:nvSpPr>
+          <p:cNvPr id="4" name="Footer Placeholder 3">
+            <a:extLst>
+              <a:ext uri="{FF2B5EF4-FFF2-40B4-BE49-F238E27FC236}">
+                <a16:creationId xmlns:a16="http://schemas.microsoft.com/office/drawing/2014/main" id="{2D57DB98-AE02-4F58-8609-916EC013249C}"/>
+              </a:ext>
+            </a:extLst>
+          </p:cNvPr>
+          <p:cNvSpPr>
+            <a:spLocks noGrp="1"/>
+          </p:cNvSpPr>
+          <p:nvPr>
+            <p:ph type="ftr" sz="quarter" idx="11"/>
+          </p:nvPr>
+        </p:nvSpPr>
+        <p:spPr/>
+        <p:txBody>
+          <a:bodyPr/>
+          <a:lstStyle/>
+          <a:p>
+            <a:r>
+              <a:rPr lang="en-US"/>
+              <a:t>https://github.com/erfz/pt-experiment</a:t>
+            </a:r>
+          </a:p>
+        </p:txBody>
+      </p:sp>
+      <p:sp>
+        <p:nvSpPr>
+          <p:cNvPr id="5" name="Slide Number Placeholder 4">
+            <a:extLst>
+              <a:ext uri="{FF2B5EF4-FFF2-40B4-BE49-F238E27FC236}">
+                <a16:creationId xmlns:a16="http://schemas.microsoft.com/office/drawing/2014/main" id="{41CEAFC0-7C0E-4D51-A90F-30C0782754E7}"/>
+              </a:ext>
+            </a:extLst>
+          </p:cNvPr>
+          <p:cNvSpPr>
+            <a:spLocks noGrp="1"/>
+          </p:cNvSpPr>
+          <p:nvPr>
+            <p:ph type="sldNum" sz="quarter" idx="12"/>
+          </p:nvPr>
+        </p:nvSpPr>
+        <p:spPr/>
+        <p:txBody>
+          <a:bodyPr/>
+          <a:lstStyle/>
+          <a:p>
+            <a:fld id="{92B06790-5D7A-46E6-89FE-8F323915C98E}" type="slidenum">
+              <a:rPr lang="en-US" smtClean="0"/>
+              <a:t>10</a:t>
+            </a:fld>
+            <a:endParaRPr lang="en-US"/>
+          </a:p>
+        </p:txBody>
+      </p:sp>
+    </p:spTree>
+    <p:extLst>
+      <p:ext uri="{BB962C8B-B14F-4D97-AF65-F5344CB8AC3E}">
+        <p14:creationId xmlns:p14="http://schemas.microsoft.com/office/powerpoint/2010/main" val="11347367"/>
+      </p:ext>
+    </p:extLst>
+  </p:cSld>
+  <p:clrMapOvr>
+    <a:masterClrMapping/>
+  </p:clrMapOvr>
+</p:sld>
+</file>
+
+<file path=ppt/slides/slide11.xml><?xml version="1.0" encoding="utf-8"?>
+<p:sld xmlns:a="http://schemas.openxmlformats.org/drawingml/2006/main" xmlns:r="http://schemas.openxmlformats.org/officeDocument/2006/relationships" xmlns:p="http://schemas.openxmlformats.org/presentationml/2006/main">
+  <p:cSld>
+    <p:spTree>
+      <p:nvGrpSpPr>
+        <p:cNvPr id="1" name=""/>
+        <p:cNvGrpSpPr/>
+        <p:nvPr/>
+      </p:nvGrpSpPr>
+      <p:grpSpPr>
+        <a:xfrm>
+          <a:off x="0" y="0"/>
+          <a:ext cx="0" cy="0"/>
+          <a:chOff x="0" y="0"/>
+          <a:chExt cx="0" cy="0"/>
+        </a:xfrm>
+      </p:grpSpPr>
       <p:pic>
         <p:nvPicPr>
           <p:cNvPr id="5" name="Graphic 4">
             <a:extLst>
               <a:ext uri="{FF2B5EF4-FFF2-40B4-BE49-F238E27FC236}">
-                <a16:creationId xmlns:a16="http://schemas.microsoft.com/office/drawing/2014/main" id="{282CE5F3-C380-45C1-A229-0E4C03076725}"/>
+                <a16:creationId xmlns:a16="http://schemas.microsoft.com/office/drawing/2014/main" id="{291D6174-8DCB-4694-966F-98A29C7B6234}"/>
+              </a:ext>
+            </a:extLst>
+          </p:cNvPr>
+          <p:cNvPicPr>
+            <a:picLocks noChangeAspect="1"/>
+          </p:cNvPicPr>
+          <p:nvPr/>
+        </p:nvPicPr>
+        <p:blipFill>
+          <a:blip r:embed="rId2">
+            <a:extLst>
+              <a:ext uri="{28A0092B-C50C-407E-A947-70E740481C1C}">
+                <a14:useLocalDpi xmlns:a14="http://schemas.microsoft.com/office/drawing/2010/main" val="0"/>
+              </a:ext>
+              <a:ext uri="{96DAC541-7B7A-43D3-8B79-37D633B846F1}">
+                <asvg:svgBlip xmlns:asvg="http://schemas.microsoft.com/office/drawing/2016/SVG/main" r:embed="rId3"/>
+              </a:ext>
+            </a:extLst>
+          </a:blip>
+          <a:stretch>
+            <a:fillRect/>
+          </a:stretch>
+        </p:blipFill>
+        <p:spPr>
+          <a:xfrm>
+            <a:off x="1971983" y="626270"/>
+            <a:ext cx="8248033" cy="5605459"/>
+          </a:xfrm>
+          <a:prstGeom prst="rect">
+            <a:avLst/>
+          </a:prstGeom>
+        </p:spPr>
+      </p:pic>
+      <p:sp>
+        <p:nvSpPr>
+          <p:cNvPr id="8" name="Footer Placeholder 7">
+            <a:extLst>
+              <a:ext uri="{FF2B5EF4-FFF2-40B4-BE49-F238E27FC236}">
+                <a16:creationId xmlns:a16="http://schemas.microsoft.com/office/drawing/2014/main" id="{B52228D7-140D-4E38-B925-08298121A160}"/>
+              </a:ext>
+            </a:extLst>
+          </p:cNvPr>
+          <p:cNvSpPr>
+            <a:spLocks noGrp="1"/>
+          </p:cNvSpPr>
+          <p:nvPr>
+            <p:ph type="ftr" sz="quarter" idx="11"/>
+          </p:nvPr>
+        </p:nvSpPr>
+        <p:spPr/>
+        <p:txBody>
+          <a:bodyPr/>
+          <a:lstStyle/>
+          <a:p>
+            <a:r>
+              <a:rPr lang="en-US"/>
+              <a:t>https://github.com/erfz/pt-experiment</a:t>
+            </a:r>
+          </a:p>
+        </p:txBody>
+      </p:sp>
+      <p:sp>
+        <p:nvSpPr>
+          <p:cNvPr id="9" name="Slide Number Placeholder 8">
+            <a:extLst>
+              <a:ext uri="{FF2B5EF4-FFF2-40B4-BE49-F238E27FC236}">
+                <a16:creationId xmlns:a16="http://schemas.microsoft.com/office/drawing/2014/main" id="{B65B2157-079E-4C92-957C-C9B9664CF329}"/>
+              </a:ext>
+            </a:extLst>
+          </p:cNvPr>
+          <p:cNvSpPr>
+            <a:spLocks noGrp="1"/>
+          </p:cNvSpPr>
+          <p:nvPr>
+            <p:ph type="sldNum" sz="quarter" idx="12"/>
+          </p:nvPr>
+        </p:nvSpPr>
+        <p:spPr/>
+        <p:txBody>
+          <a:bodyPr/>
+          <a:lstStyle/>
+          <a:p>
+            <a:fld id="{92B06790-5D7A-46E6-89FE-8F323915C98E}" type="slidenum">
+              <a:rPr lang="en-US" smtClean="0"/>
+              <a:t>11</a:t>
+            </a:fld>
+            <a:endParaRPr lang="en-US"/>
+          </a:p>
+        </p:txBody>
+      </p:sp>
+    </p:spTree>
+    <p:extLst>
+      <p:ext uri="{BB962C8B-B14F-4D97-AF65-F5344CB8AC3E}">
+        <p14:creationId xmlns:p14="http://schemas.microsoft.com/office/powerpoint/2010/main" val="2375993115"/>
+      </p:ext>
+    </p:extLst>
+  </p:cSld>
+  <p:clrMapOvr>
+    <a:masterClrMapping/>
+  </p:clrMapOvr>
+</p:sld>
+</file>
+
+<file path=ppt/slides/slide12.xml><?xml version="1.0" encoding="utf-8"?>
+<p:sld xmlns:a="http://schemas.openxmlformats.org/drawingml/2006/main" xmlns:r="http://schemas.openxmlformats.org/officeDocument/2006/relationships" xmlns:p="http://schemas.openxmlformats.org/presentationml/2006/main" show="0">
+  <p:cSld>
+    <p:spTree>
+      <p:nvGrpSpPr>
+        <p:cNvPr id="1" name=""/>
+        <p:cNvGrpSpPr/>
+        <p:nvPr/>
+      </p:nvGrpSpPr>
+      <p:grpSpPr>
+        <a:xfrm>
+          <a:off x="0" y="0"/>
+          <a:ext cx="0" cy="0"/>
+          <a:chOff x="0" y="0"/>
+          <a:chExt cx="0" cy="0"/>
+        </a:xfrm>
+      </p:grpSpPr>
+      <p:pic>
+        <p:nvPicPr>
+          <p:cNvPr id="6" name="Picture 5">
+            <a:extLst>
+              <a:ext uri="{FF2B5EF4-FFF2-40B4-BE49-F238E27FC236}">
+                <a16:creationId xmlns:a16="http://schemas.microsoft.com/office/drawing/2014/main" id="{87A65286-1D77-42F5-8E2D-7BBFA38C612C}"/>
+              </a:ext>
+            </a:extLst>
+          </p:cNvPr>
+          <p:cNvPicPr>
+            <a:picLocks noChangeAspect="1"/>
+          </p:cNvPicPr>
+          <p:nvPr/>
+        </p:nvPicPr>
+        <p:blipFill>
+          <a:blip r:embed="rId2"/>
+          <a:stretch>
+            <a:fillRect/>
+          </a:stretch>
+        </p:blipFill>
+        <p:spPr>
+          <a:xfrm>
+            <a:off x="330567" y="1581006"/>
+            <a:ext cx="5546710" cy="3695987"/>
+          </a:xfrm>
+          <a:prstGeom prst="rect">
+            <a:avLst/>
+          </a:prstGeom>
+        </p:spPr>
+      </p:pic>
+      <p:pic>
+        <p:nvPicPr>
+          <p:cNvPr id="8" name="Graphic 7">
+            <a:extLst>
+              <a:ext uri="{FF2B5EF4-FFF2-40B4-BE49-F238E27FC236}">
+                <a16:creationId xmlns:a16="http://schemas.microsoft.com/office/drawing/2014/main" id="{3D124E56-8153-4DD1-AB58-1BF8C4470542}"/>
               </a:ext>
             </a:extLst>
           </p:cNvPr>
@@ -4100,8 +4804,8 @@
         </p:blipFill>
         <p:spPr>
           <a:xfrm>
-            <a:off x="2729590" y="533929"/>
-            <a:ext cx="6732820" cy="4412897"/>
+            <a:off x="6096000" y="1574883"/>
+            <a:ext cx="5557999" cy="3777281"/>
           </a:xfrm>
           <a:prstGeom prst="rect">
             <a:avLst/>
@@ -4110,10 +4814,10 @@
       </p:pic>
       <p:sp>
         <p:nvSpPr>
-          <p:cNvPr id="6" name="TextBox 5">
-            <a:extLst>
-              <a:ext uri="{FF2B5EF4-FFF2-40B4-BE49-F238E27FC236}">
-                <a16:creationId xmlns:a16="http://schemas.microsoft.com/office/drawing/2014/main" id="{C08D09DA-C28E-4E3A-8581-44723F09F193}"/>
+          <p:cNvPr id="9" name="TextBox 8">
+            <a:extLst>
+              <a:ext uri="{FF2B5EF4-FFF2-40B4-BE49-F238E27FC236}">
+                <a16:creationId xmlns:a16="http://schemas.microsoft.com/office/drawing/2014/main" id="{5E7690CD-CE62-488F-9F92-41CDBD61C79E}"/>
               </a:ext>
             </a:extLst>
           </p:cNvPr>
@@ -4122,8 +4826,8 @@
         </p:nvSpPr>
         <p:spPr>
           <a:xfrm>
-            <a:off x="4038600" y="5066812"/>
-            <a:ext cx="4687210" cy="1169551"/>
+            <a:off x="2676877" y="5632005"/>
+            <a:ext cx="6838245" cy="369332"/>
           </a:xfrm>
           <a:prstGeom prst="rect">
             <a:avLst/>
@@ -4137,42 +4841,18 @@
           <a:lstStyle/>
           <a:p>
             <a:r>
-              <a:rPr lang="en-US" sz="1400" dirty="0"/>
-              <a:t>Final spin: [0.0, -0.6682047135397682, 0.7439771503034246]</a:t>
-            </a:r>
-          </a:p>
-          <a:p>
-            <a:r>
-              <a:rPr lang="en-US" sz="1400" dirty="0"/>
-              <a:t>Speed: 1000 m/s</a:t>
-            </a:r>
-          </a:p>
-          <a:p>
-            <a:r>
-              <a:rPr lang="en-US" sz="1400" dirty="0"/>
-              <a:t>Wire separation: 10 m</a:t>
-            </a:r>
-          </a:p>
-          <a:p>
-            <a:r>
-              <a:rPr lang="en-US" sz="1400" dirty="0"/>
-              <a:t>Top wire: 10 A</a:t>
-            </a:r>
-          </a:p>
-          <a:p>
-            <a:r>
-              <a:rPr lang="en-US" sz="1400" dirty="0"/>
-              <a:t>Bottom wire: -10 A</a:t>
-            </a:r>
-          </a:p>
-        </p:txBody>
-      </p:sp>
-      <p:sp>
-        <p:nvSpPr>
-          <p:cNvPr id="10" name="Footer Placeholder 9">
-            <a:extLst>
-              <a:ext uri="{FF2B5EF4-FFF2-40B4-BE49-F238E27FC236}">
-                <a16:creationId xmlns:a16="http://schemas.microsoft.com/office/drawing/2014/main" id="{1F884B62-BE24-4792-A611-7E4DEB462F77}"/>
+              <a:rPr lang="en-US" dirty="0"/>
+              <a:t>Number of domains passed thru per particle = [1, 2, 5, 8, 10, 12, 15, 20]</a:t>
+            </a:r>
+          </a:p>
+        </p:txBody>
+      </p:sp>
+      <p:sp>
+        <p:nvSpPr>
+          <p:cNvPr id="12" name="Footer Placeholder 11">
+            <a:extLst>
+              <a:ext uri="{FF2B5EF4-FFF2-40B4-BE49-F238E27FC236}">
+                <a16:creationId xmlns:a16="http://schemas.microsoft.com/office/drawing/2014/main" id="{F8BE2007-8430-467A-93CA-6BD318936ACD}"/>
               </a:ext>
             </a:extLst>
           </p:cNvPr>
@@ -4197,10 +4877,10 @@
       </p:sp>
       <p:sp>
         <p:nvSpPr>
-          <p:cNvPr id="11" name="Slide Number Placeholder 10">
-            <a:extLst>
-              <a:ext uri="{FF2B5EF4-FFF2-40B4-BE49-F238E27FC236}">
-                <a16:creationId xmlns:a16="http://schemas.microsoft.com/office/drawing/2014/main" id="{947715D9-30A5-4227-A50A-21B68184C050}"/>
+          <p:cNvPr id="13" name="Slide Number Placeholder 12">
+            <a:extLst>
+              <a:ext uri="{FF2B5EF4-FFF2-40B4-BE49-F238E27FC236}">
+                <a16:creationId xmlns:a16="http://schemas.microsoft.com/office/drawing/2014/main" id="{9983AB45-1A6F-47C4-803A-0B4BBF058363}"/>
               </a:ext>
             </a:extLst>
           </p:cNvPr>
@@ -4218,7 +4898,7 @@
           <a:p>
             <a:fld id="{92B06790-5D7A-46E6-89FE-8F323915C98E}" type="slidenum">
               <a:rPr lang="en-US" smtClean="0"/>
-              <a:t>1</a:t>
+              <a:t>12</a:t>
             </a:fld>
             <a:endParaRPr lang="en-US"/>
           </a:p>
@@ -4227,7 +4907,259 @@
     </p:spTree>
     <p:extLst>
       <p:ext uri="{BB962C8B-B14F-4D97-AF65-F5344CB8AC3E}">
-        <p14:creationId xmlns:p14="http://schemas.microsoft.com/office/powerpoint/2010/main" val="1724081649"/>
+        <p14:creationId xmlns:p14="http://schemas.microsoft.com/office/powerpoint/2010/main" val="2495429277"/>
+      </p:ext>
+    </p:extLst>
+  </p:cSld>
+  <p:clrMapOvr>
+    <a:masterClrMapping/>
+  </p:clrMapOvr>
+</p:sld>
+</file>
+
+<file path=ppt/slides/slide13.xml><?xml version="1.0" encoding="utf-8"?>
+<p:sld xmlns:a="http://schemas.openxmlformats.org/drawingml/2006/main" xmlns:r="http://schemas.openxmlformats.org/officeDocument/2006/relationships" xmlns:p="http://schemas.openxmlformats.org/presentationml/2006/main" show="0">
+  <p:cSld>
+    <p:spTree>
+      <p:nvGrpSpPr>
+        <p:cNvPr id="1" name=""/>
+        <p:cNvGrpSpPr/>
+        <p:nvPr/>
+      </p:nvGrpSpPr>
+      <p:grpSpPr>
+        <a:xfrm>
+          <a:off x="0" y="0"/>
+          <a:ext cx="0" cy="0"/>
+          <a:chOff x="0" y="0"/>
+          <a:chExt cx="0" cy="0"/>
+        </a:xfrm>
+      </p:grpSpPr>
+      <p:sp>
+        <p:nvSpPr>
+          <p:cNvPr id="4" name="Footer Placeholder 3">
+            <a:extLst>
+              <a:ext uri="{FF2B5EF4-FFF2-40B4-BE49-F238E27FC236}">
+                <a16:creationId xmlns:a16="http://schemas.microsoft.com/office/drawing/2014/main" id="{6E7D6938-8D84-4CE0-9BD1-C5AC20397C0F}"/>
+              </a:ext>
+            </a:extLst>
+          </p:cNvPr>
+          <p:cNvSpPr>
+            <a:spLocks noGrp="1"/>
+          </p:cNvSpPr>
+          <p:nvPr>
+            <p:ph type="ftr" sz="quarter" idx="11"/>
+          </p:nvPr>
+        </p:nvSpPr>
+        <p:spPr/>
+        <p:txBody>
+          <a:bodyPr/>
+          <a:lstStyle/>
+          <a:p>
+            <a:r>
+              <a:rPr lang="en-US"/>
+              <a:t>https://github.com/erfz/pt-experiment</a:t>
+            </a:r>
+          </a:p>
+        </p:txBody>
+      </p:sp>
+      <p:sp>
+        <p:nvSpPr>
+          <p:cNvPr id="5" name="Slide Number Placeholder 4">
+            <a:extLst>
+              <a:ext uri="{FF2B5EF4-FFF2-40B4-BE49-F238E27FC236}">
+                <a16:creationId xmlns:a16="http://schemas.microsoft.com/office/drawing/2014/main" id="{92CD952C-BE06-4CAE-8FC6-CA40566FFDF9}"/>
+              </a:ext>
+            </a:extLst>
+          </p:cNvPr>
+          <p:cNvSpPr>
+            <a:spLocks noGrp="1"/>
+          </p:cNvSpPr>
+          <p:nvPr>
+            <p:ph type="sldNum" sz="quarter" idx="12"/>
+          </p:nvPr>
+        </p:nvSpPr>
+        <p:spPr/>
+        <p:txBody>
+          <a:bodyPr/>
+          <a:lstStyle/>
+          <a:p>
+            <a:fld id="{92B06790-5D7A-46E6-89FE-8F323915C98E}" type="slidenum">
+              <a:rPr lang="en-US" smtClean="0"/>
+              <a:t>13</a:t>
+            </a:fld>
+            <a:endParaRPr lang="en-US"/>
+          </a:p>
+        </p:txBody>
+      </p:sp>
+      <p:pic>
+        <p:nvPicPr>
+          <p:cNvPr id="7" name="Graphic 6">
+            <a:extLst>
+              <a:ext uri="{FF2B5EF4-FFF2-40B4-BE49-F238E27FC236}">
+                <a16:creationId xmlns:a16="http://schemas.microsoft.com/office/drawing/2014/main" id="{E13CAA40-8937-4464-A1CC-B65E75487E7E}"/>
+              </a:ext>
+            </a:extLst>
+          </p:cNvPr>
+          <p:cNvPicPr>
+            <a:picLocks noChangeAspect="1"/>
+          </p:cNvPicPr>
+          <p:nvPr/>
+        </p:nvPicPr>
+        <p:blipFill>
+          <a:blip r:embed="rId2">
+            <a:extLst>
+              <a:ext uri="{28A0092B-C50C-407E-A947-70E740481C1C}">
+                <a14:useLocalDpi xmlns:a14="http://schemas.microsoft.com/office/drawing/2010/main" val="0"/>
+              </a:ext>
+              <a:ext uri="{96DAC541-7B7A-43D3-8B79-37D633B846F1}">
+                <asvg:svgBlip xmlns:asvg="http://schemas.microsoft.com/office/drawing/2016/SVG/main" r:embed="rId3"/>
+              </a:ext>
+            </a:extLst>
+          </a:blip>
+          <a:stretch>
+            <a:fillRect/>
+          </a:stretch>
+        </p:blipFill>
+        <p:spPr>
+          <a:xfrm>
+            <a:off x="2740298" y="1122362"/>
+            <a:ext cx="6711403" cy="4613275"/>
+          </a:xfrm>
+          <a:prstGeom prst="rect">
+            <a:avLst/>
+          </a:prstGeom>
+        </p:spPr>
+      </p:pic>
+    </p:spTree>
+    <p:extLst>
+      <p:ext uri="{BB962C8B-B14F-4D97-AF65-F5344CB8AC3E}">
+        <p14:creationId xmlns:p14="http://schemas.microsoft.com/office/powerpoint/2010/main" val="2914381844"/>
+      </p:ext>
+    </p:extLst>
+  </p:cSld>
+  <p:clrMapOvr>
+    <a:masterClrMapping/>
+  </p:clrMapOvr>
+</p:sld>
+</file>
+
+<file path=ppt/slides/slide14.xml><?xml version="1.0" encoding="utf-8"?>
+<p:sld xmlns:a="http://schemas.openxmlformats.org/drawingml/2006/main" xmlns:r="http://schemas.openxmlformats.org/officeDocument/2006/relationships" xmlns:p="http://schemas.openxmlformats.org/presentationml/2006/main" show="0">
+  <p:cSld>
+    <p:spTree>
+      <p:nvGrpSpPr>
+        <p:cNvPr id="1" name=""/>
+        <p:cNvGrpSpPr/>
+        <p:nvPr/>
+      </p:nvGrpSpPr>
+      <p:grpSpPr>
+        <a:xfrm>
+          <a:off x="0" y="0"/>
+          <a:ext cx="0" cy="0"/>
+          <a:chOff x="0" y="0"/>
+          <a:chExt cx="0" cy="0"/>
+        </a:xfrm>
+      </p:grpSpPr>
+      <p:sp>
+        <p:nvSpPr>
+          <p:cNvPr id="4" name="Footer Placeholder 3">
+            <a:extLst>
+              <a:ext uri="{FF2B5EF4-FFF2-40B4-BE49-F238E27FC236}">
+                <a16:creationId xmlns:a16="http://schemas.microsoft.com/office/drawing/2014/main" id="{39E565FA-2411-473F-85B8-411B3EE95C6E}"/>
+              </a:ext>
+            </a:extLst>
+          </p:cNvPr>
+          <p:cNvSpPr>
+            <a:spLocks noGrp="1"/>
+          </p:cNvSpPr>
+          <p:nvPr>
+            <p:ph type="ftr" sz="quarter" idx="11"/>
+          </p:nvPr>
+        </p:nvSpPr>
+        <p:spPr/>
+        <p:txBody>
+          <a:bodyPr/>
+          <a:lstStyle/>
+          <a:p>
+            <a:r>
+              <a:rPr lang="en-US"/>
+              <a:t>https://github.com/erfz/pt-experiment</a:t>
+            </a:r>
+          </a:p>
+        </p:txBody>
+      </p:sp>
+      <p:sp>
+        <p:nvSpPr>
+          <p:cNvPr id="5" name="Slide Number Placeholder 4">
+            <a:extLst>
+              <a:ext uri="{FF2B5EF4-FFF2-40B4-BE49-F238E27FC236}">
+                <a16:creationId xmlns:a16="http://schemas.microsoft.com/office/drawing/2014/main" id="{627D3338-C3DD-4109-BE1D-03D6BAC0C9AA}"/>
+              </a:ext>
+            </a:extLst>
+          </p:cNvPr>
+          <p:cNvSpPr>
+            <a:spLocks noGrp="1"/>
+          </p:cNvSpPr>
+          <p:nvPr>
+            <p:ph type="sldNum" sz="quarter" idx="12"/>
+          </p:nvPr>
+        </p:nvSpPr>
+        <p:spPr/>
+        <p:txBody>
+          <a:bodyPr/>
+          <a:lstStyle/>
+          <a:p>
+            <a:fld id="{92B06790-5D7A-46E6-89FE-8F323915C98E}" type="slidenum">
+              <a:rPr lang="en-US" smtClean="0"/>
+              <a:t>14</a:t>
+            </a:fld>
+            <a:endParaRPr lang="en-US"/>
+          </a:p>
+        </p:txBody>
+      </p:sp>
+      <p:pic>
+        <p:nvPicPr>
+          <p:cNvPr id="7" name="Graphic 6">
+            <a:extLst>
+              <a:ext uri="{FF2B5EF4-FFF2-40B4-BE49-F238E27FC236}">
+                <a16:creationId xmlns:a16="http://schemas.microsoft.com/office/drawing/2014/main" id="{FEC4A77B-ECD6-482E-B76C-6D0928A95971}"/>
+              </a:ext>
+            </a:extLst>
+          </p:cNvPr>
+          <p:cNvPicPr>
+            <a:picLocks noChangeAspect="1"/>
+          </p:cNvPicPr>
+          <p:nvPr/>
+        </p:nvPicPr>
+        <p:blipFill>
+          <a:blip r:embed="rId2">
+            <a:extLst>
+              <a:ext uri="{28A0092B-C50C-407E-A947-70E740481C1C}">
+                <a14:useLocalDpi xmlns:a14="http://schemas.microsoft.com/office/drawing/2010/main" val="0"/>
+              </a:ext>
+              <a:ext uri="{96DAC541-7B7A-43D3-8B79-37D633B846F1}">
+                <asvg:svgBlip xmlns:asvg="http://schemas.microsoft.com/office/drawing/2016/SVG/main" r:embed="rId3"/>
+              </a:ext>
+            </a:extLst>
+          </a:blip>
+          <a:stretch>
+            <a:fillRect/>
+          </a:stretch>
+        </p:blipFill>
+        <p:spPr>
+          <a:xfrm>
+            <a:off x="2882811" y="1245279"/>
+            <a:ext cx="6426377" cy="4367441"/>
+          </a:xfrm>
+          <a:prstGeom prst="rect">
+            <a:avLst/>
+          </a:prstGeom>
+        </p:spPr>
+      </p:pic>
+    </p:spTree>
+    <p:extLst>
+      <p:ext uri="{BB962C8B-B14F-4D97-AF65-F5344CB8AC3E}">
+        <p14:creationId xmlns:p14="http://schemas.microsoft.com/office/powerpoint/2010/main" val="272042925"/>
       </p:ext>
     </p:extLst>
   </p:cSld>
@@ -4254,12 +5186,105 @@
           <a:chExt cx="0" cy="0"/>
         </a:xfrm>
       </p:grpSpPr>
+      <p:sp>
+        <p:nvSpPr>
+          <p:cNvPr id="8" name="Title 7">
+            <a:extLst>
+              <a:ext uri="{FF2B5EF4-FFF2-40B4-BE49-F238E27FC236}">
+                <a16:creationId xmlns:a16="http://schemas.microsoft.com/office/drawing/2014/main" id="{54D6CAF0-9C87-4CBA-9EA9-DAEF2AD4525B}"/>
+              </a:ext>
+            </a:extLst>
+          </p:cNvPr>
+          <p:cNvSpPr>
+            <a:spLocks noGrp="1"/>
+          </p:cNvSpPr>
+          <p:nvPr>
+            <p:ph type="ctrTitle"/>
+          </p:nvPr>
+        </p:nvSpPr>
+        <p:spPr>
+          <a:xfrm>
+            <a:off x="835377" y="573580"/>
+            <a:ext cx="10518422" cy="975626"/>
+          </a:xfrm>
+        </p:spPr>
+        <p:txBody>
+          <a:bodyPr>
+            <a:noAutofit/>
+          </a:bodyPr>
+          <a:lstStyle/>
+          <a:p>
+            <a:pPr algn="l"/>
+            <a:r>
+              <a:rPr lang="en-US" sz="3200" dirty="0"/>
+              <a:t>Goal: obtain classical polarization predictions for P/T experiment to compare against empirical results</a:t>
+            </a:r>
+          </a:p>
+        </p:txBody>
+      </p:sp>
+      <p:sp>
+        <p:nvSpPr>
+          <p:cNvPr id="4" name="Footer Placeholder 3">
+            <a:extLst>
+              <a:ext uri="{FF2B5EF4-FFF2-40B4-BE49-F238E27FC236}">
+                <a16:creationId xmlns:a16="http://schemas.microsoft.com/office/drawing/2014/main" id="{08CC4CC9-2E89-4C85-855B-FF4128A0B2B4}"/>
+              </a:ext>
+            </a:extLst>
+          </p:cNvPr>
+          <p:cNvSpPr>
+            <a:spLocks noGrp="1"/>
+          </p:cNvSpPr>
+          <p:nvPr>
+            <p:ph type="ftr" sz="quarter" idx="11"/>
+          </p:nvPr>
+        </p:nvSpPr>
+        <p:spPr/>
+        <p:txBody>
+          <a:bodyPr/>
+          <a:lstStyle/>
+          <a:p>
+            <a:r>
+              <a:rPr lang="en-US"/>
+              <a:t>https://github.com/erfz/pt-experiment</a:t>
+            </a:r>
+          </a:p>
+        </p:txBody>
+      </p:sp>
+      <p:sp>
+        <p:nvSpPr>
+          <p:cNvPr id="5" name="Slide Number Placeholder 4">
+            <a:extLst>
+              <a:ext uri="{FF2B5EF4-FFF2-40B4-BE49-F238E27FC236}">
+                <a16:creationId xmlns:a16="http://schemas.microsoft.com/office/drawing/2014/main" id="{51E9ACB0-69F3-4DFB-826B-37175862EF04}"/>
+              </a:ext>
+            </a:extLst>
+          </p:cNvPr>
+          <p:cNvSpPr>
+            <a:spLocks noGrp="1"/>
+          </p:cNvSpPr>
+          <p:nvPr>
+            <p:ph type="sldNum" sz="quarter" idx="12"/>
+          </p:nvPr>
+        </p:nvSpPr>
+        <p:spPr/>
+        <p:txBody>
+          <a:bodyPr/>
+          <a:lstStyle/>
+          <a:p>
+            <a:fld id="{92B06790-5D7A-46E6-89FE-8F323915C98E}" type="slidenum">
+              <a:rPr lang="en-US" smtClean="0"/>
+              <a:t>2</a:t>
+            </a:fld>
+            <a:endParaRPr lang="en-US"/>
+          </a:p>
+        </p:txBody>
+      </p:sp>
       <p:pic>
         <p:nvPicPr>
-          <p:cNvPr id="5" name="Graphic 4">
-            <a:extLst>
-              <a:ext uri="{FF2B5EF4-FFF2-40B4-BE49-F238E27FC236}">
-                <a16:creationId xmlns:a16="http://schemas.microsoft.com/office/drawing/2014/main" id="{E1378719-C7F9-448F-A03C-004BF9B367C8}"/>
+          <p:cNvPr id="7" name="Picture 6" descr="Chart&#10;&#10;Description automatically generated">
+            <a:extLst>
+              <a:ext uri="{FF2B5EF4-FFF2-40B4-BE49-F238E27FC236}">
+                <a16:creationId xmlns:a16="http://schemas.microsoft.com/office/drawing/2014/main" id="{CDA29F23-8CCA-4AF0-8102-993BB53C898A}"/>
               </a:ext>
             </a:extLst>
           </p:cNvPr>
@@ -4269,13 +5294,10 @@
           <p:nvPr/>
         </p:nvPicPr>
         <p:blipFill>
-          <a:blip r:embed="rId2">
+          <a:blip r:embed="rId3">
             <a:extLst>
               <a:ext uri="{28A0092B-C50C-407E-A947-70E740481C1C}">
                 <a14:useLocalDpi xmlns:a14="http://schemas.microsoft.com/office/drawing/2010/main" val="0"/>
-              </a:ext>
-              <a:ext uri="{96DAC541-7B7A-43D3-8B79-37D633B846F1}">
-                <asvg:svgBlip xmlns:asvg="http://schemas.microsoft.com/office/drawing/2016/SVG/main" r:embed="rId3"/>
               </a:ext>
             </a:extLst>
           </a:blip>
@@ -4285,20 +5307,100 @@
         </p:blipFill>
         <p:spPr>
           <a:xfrm>
-            <a:off x="2620203" y="326231"/>
-            <a:ext cx="6951593" cy="4556287"/>
+            <a:off x="5643567" y="2047088"/>
+            <a:ext cx="5295200" cy="3811379"/>
           </a:xfrm>
           <a:prstGeom prst="rect">
             <a:avLst/>
           </a:prstGeom>
         </p:spPr>
       </p:pic>
-      <p:sp>
-        <p:nvSpPr>
-          <p:cNvPr id="6" name="TextBox 5">
-            <a:extLst>
-              <a:ext uri="{FF2B5EF4-FFF2-40B4-BE49-F238E27FC236}">
-                <a16:creationId xmlns:a16="http://schemas.microsoft.com/office/drawing/2014/main" id="{2B66FDC6-A7BB-416C-8B27-AD79CB402731}"/>
+      <p:cxnSp>
+        <p:nvCxnSpPr>
+          <p:cNvPr id="11" name="Straight Arrow Connector 10">
+            <a:extLst>
+              <a:ext uri="{FF2B5EF4-FFF2-40B4-BE49-F238E27FC236}">
+                <a16:creationId xmlns:a16="http://schemas.microsoft.com/office/drawing/2014/main" id="{4D57B79C-457B-40EF-8EB3-B27C299CC19D}"/>
+              </a:ext>
+            </a:extLst>
+          </p:cNvPr>
+          <p:cNvCxnSpPr/>
+          <p:nvPr/>
+        </p:nvCxnSpPr>
+        <p:spPr>
+          <a:xfrm>
+            <a:off x="5895707" y="3364685"/>
+            <a:ext cx="1016000" cy="0"/>
+          </a:xfrm>
+          <a:prstGeom prst="straightConnector1">
+            <a:avLst/>
+          </a:prstGeom>
+          <a:ln>
+            <a:tailEnd type="triangle"/>
+          </a:ln>
+        </p:spPr>
+        <p:style>
+          <a:lnRef idx="1">
+            <a:schemeClr val="accent1"/>
+          </a:lnRef>
+          <a:fillRef idx="0">
+            <a:schemeClr val="accent1"/>
+          </a:fillRef>
+          <a:effectRef idx="0">
+            <a:schemeClr val="accent1"/>
+          </a:effectRef>
+          <a:fontRef idx="minor">
+            <a:schemeClr val="tx1"/>
+          </a:fontRef>
+        </p:style>
+      </p:cxnSp>
+      <p:cxnSp>
+        <p:nvCxnSpPr>
+          <p:cNvPr id="17" name="Straight Arrow Connector 16">
+            <a:extLst>
+              <a:ext uri="{FF2B5EF4-FFF2-40B4-BE49-F238E27FC236}">
+                <a16:creationId xmlns:a16="http://schemas.microsoft.com/office/drawing/2014/main" id="{C6E997FE-3C4E-4D96-A72C-8DDA2E5D5208}"/>
+              </a:ext>
+            </a:extLst>
+          </p:cNvPr>
+          <p:cNvCxnSpPr>
+            <a:cxnSpLocks/>
+          </p:cNvCxnSpPr>
+          <p:nvPr/>
+        </p:nvCxnSpPr>
+        <p:spPr>
+          <a:xfrm flipV="1">
+            <a:off x="5895707" y="2416419"/>
+            <a:ext cx="0" cy="948266"/>
+          </a:xfrm>
+          <a:prstGeom prst="straightConnector1">
+            <a:avLst/>
+          </a:prstGeom>
+          <a:ln>
+            <a:tailEnd type="triangle"/>
+          </a:ln>
+        </p:spPr>
+        <p:style>
+          <a:lnRef idx="1">
+            <a:schemeClr val="accent1"/>
+          </a:lnRef>
+          <a:fillRef idx="0">
+            <a:schemeClr val="accent1"/>
+          </a:fillRef>
+          <a:effectRef idx="0">
+            <a:schemeClr val="accent1"/>
+          </a:effectRef>
+          <a:fontRef idx="minor">
+            <a:schemeClr val="tx1"/>
+          </a:fontRef>
+        </p:style>
+      </p:cxnSp>
+      <p:sp>
+        <p:nvSpPr>
+          <p:cNvPr id="20" name="TextBox 19">
+            <a:extLst>
+              <a:ext uri="{FF2B5EF4-FFF2-40B4-BE49-F238E27FC236}">
+                <a16:creationId xmlns:a16="http://schemas.microsoft.com/office/drawing/2014/main" id="{8F28CDED-A646-44E0-A280-63AE9EECA405}"/>
               </a:ext>
             </a:extLst>
           </p:cNvPr>
@@ -4307,8 +5409,8 @@
         </p:nvSpPr>
         <p:spPr>
           <a:xfrm>
-            <a:off x="2969566" y="5142380"/>
-            <a:ext cx="6252865" cy="954107"/>
+            <a:off x="6913818" y="3171362"/>
+            <a:ext cx="327378" cy="369332"/>
           </a:xfrm>
           <a:prstGeom prst="rect">
             <a:avLst/>
@@ -4322,91 +5424,248 @@
           <a:lstStyle/>
           <a:p>
             <a:r>
-              <a:rPr lang="pt-BR" sz="1400" dirty="0"/>
-              <a:t>Hx = 10, H_dot = -41.5</a:t>
-            </a:r>
-          </a:p>
-          <a:p>
-            <a:r>
-              <a:rPr lang="en-US" sz="1400" dirty="0"/>
-              <a:t>Final spin: [0.07625445246664814, 0.9970861336744352, 0.003762795417459164]</a:t>
-            </a:r>
-          </a:p>
-          <a:p>
-            <a:r>
-              <a:rPr lang="en-US" sz="1400" dirty="0"/>
-              <a:t>Corresponding realignment probability: 50.18813977087295%</a:t>
-            </a:r>
-          </a:p>
-          <a:p>
-            <a:r>
-              <a:rPr lang="en-US" sz="1400" dirty="0"/>
-              <a:t>Theoretical realignment probability: 49.97872272254392%</a:t>
-            </a:r>
-          </a:p>
-        </p:txBody>
-      </p:sp>
-      <p:sp>
-        <p:nvSpPr>
-          <p:cNvPr id="9" name="Footer Placeholder 8">
-            <a:extLst>
-              <a:ext uri="{FF2B5EF4-FFF2-40B4-BE49-F238E27FC236}">
-                <a16:creationId xmlns:a16="http://schemas.microsoft.com/office/drawing/2014/main" id="{3C41F966-B9D9-40F1-A015-02B6C82C62A5}"/>
-              </a:ext>
-            </a:extLst>
-          </p:cNvPr>
-          <p:cNvSpPr>
-            <a:spLocks noGrp="1"/>
-          </p:cNvSpPr>
-          <p:nvPr>
-            <p:ph type="ftr" sz="quarter" idx="11"/>
-          </p:nvPr>
-        </p:nvSpPr>
-        <p:spPr/>
-        <p:txBody>
-          <a:bodyPr/>
-          <a:lstStyle/>
-          <a:p>
-            <a:r>
-              <a:rPr lang="en-US"/>
-              <a:t>https://github.com/erfz/pt-experiment</a:t>
-            </a:r>
-          </a:p>
-        </p:txBody>
-      </p:sp>
-      <p:sp>
-        <p:nvSpPr>
-          <p:cNvPr id="10" name="Slide Number Placeholder 9">
-            <a:extLst>
-              <a:ext uri="{FF2B5EF4-FFF2-40B4-BE49-F238E27FC236}">
-                <a16:creationId xmlns:a16="http://schemas.microsoft.com/office/drawing/2014/main" id="{362420F0-6716-4777-A074-657B58F1FB68}"/>
-              </a:ext>
-            </a:extLst>
-          </p:cNvPr>
-          <p:cNvSpPr>
-            <a:spLocks noGrp="1"/>
-          </p:cNvSpPr>
-          <p:nvPr>
-            <p:ph type="sldNum" sz="quarter" idx="12"/>
-          </p:nvPr>
-        </p:nvSpPr>
-        <p:spPr/>
-        <p:txBody>
-          <a:bodyPr/>
-          <a:lstStyle/>
-          <a:p>
-            <a:fld id="{92B06790-5D7A-46E6-89FE-8F323915C98E}" type="slidenum">
-              <a:rPr lang="en-US" smtClean="0"/>
-              <a:t>2</a:t>
-            </a:fld>
+              <a:rPr lang="en-US" dirty="0"/>
+              <a:t>x</a:t>
+            </a:r>
+          </a:p>
+        </p:txBody>
+      </p:sp>
+      <p:sp>
+        <p:nvSpPr>
+          <p:cNvPr id="21" name="TextBox 20">
+            <a:extLst>
+              <a:ext uri="{FF2B5EF4-FFF2-40B4-BE49-F238E27FC236}">
+                <a16:creationId xmlns:a16="http://schemas.microsoft.com/office/drawing/2014/main" id="{D204CF75-FC54-4951-A0DE-C52FF263E209}"/>
+              </a:ext>
+            </a:extLst>
+          </p:cNvPr>
+          <p:cNvSpPr txBox="1"/>
+          <p:nvPr/>
+        </p:nvSpPr>
+        <p:spPr>
+          <a:xfrm>
+            <a:off x="5768622" y="2047088"/>
+            <a:ext cx="327378" cy="369332"/>
+          </a:xfrm>
+          <a:prstGeom prst="rect">
+            <a:avLst/>
+          </a:prstGeom>
+          <a:noFill/>
+        </p:spPr>
+        <p:txBody>
+          <a:bodyPr wrap="square" rtlCol="0">
+            <a:spAutoFit/>
+          </a:bodyPr>
+          <a:lstStyle/>
+          <a:p>
+            <a:r>
+              <a:rPr lang="en-US" dirty="0"/>
+              <a:t>y</a:t>
+            </a:r>
+          </a:p>
+        </p:txBody>
+      </p:sp>
+      <p:sp>
+        <p:nvSpPr>
+          <p:cNvPr id="22" name="Oval 21">
+            <a:extLst>
+              <a:ext uri="{FF2B5EF4-FFF2-40B4-BE49-F238E27FC236}">
+                <a16:creationId xmlns:a16="http://schemas.microsoft.com/office/drawing/2014/main" id="{14AF3461-A38D-4910-ADC4-FF0444B98123}"/>
+              </a:ext>
+            </a:extLst>
+          </p:cNvPr>
+          <p:cNvSpPr/>
+          <p:nvPr/>
+        </p:nvSpPr>
+        <p:spPr>
+          <a:xfrm>
+            <a:off x="5770117" y="3230439"/>
+            <a:ext cx="251178" cy="251178"/>
+          </a:xfrm>
+          <a:prstGeom prst="ellipse">
+            <a:avLst/>
+          </a:prstGeom>
+          <a:solidFill>
+            <a:schemeClr val="bg1"/>
+          </a:solidFill>
+        </p:spPr>
+        <p:style>
+          <a:lnRef idx="2">
+            <a:schemeClr val="accent1">
+              <a:shade val="50000"/>
+            </a:schemeClr>
+          </a:lnRef>
+          <a:fillRef idx="1">
+            <a:schemeClr val="accent1"/>
+          </a:fillRef>
+          <a:effectRef idx="0">
+            <a:schemeClr val="accent1"/>
+          </a:effectRef>
+          <a:fontRef idx="minor">
+            <a:schemeClr val="lt1"/>
+          </a:fontRef>
+        </p:style>
+        <p:txBody>
+          <a:bodyPr rtlCol="0" anchor="ctr"/>
+          <a:lstStyle/>
+          <a:p>
+            <a:pPr algn="ctr"/>
             <a:endParaRPr lang="en-US"/>
+          </a:p>
+        </p:txBody>
+      </p:sp>
+      <p:sp>
+        <p:nvSpPr>
+          <p:cNvPr id="23" name="Oval 22">
+            <a:extLst>
+              <a:ext uri="{FF2B5EF4-FFF2-40B4-BE49-F238E27FC236}">
+                <a16:creationId xmlns:a16="http://schemas.microsoft.com/office/drawing/2014/main" id="{E2629515-6F02-47D1-8D4E-490E8A5560DD}"/>
+              </a:ext>
+            </a:extLst>
+          </p:cNvPr>
+          <p:cNvSpPr/>
+          <p:nvPr/>
+        </p:nvSpPr>
+        <p:spPr>
+          <a:xfrm flipH="1">
+            <a:off x="5859100" y="3317336"/>
+            <a:ext cx="73211" cy="77384"/>
+          </a:xfrm>
+          <a:prstGeom prst="ellipse">
+            <a:avLst/>
+          </a:prstGeom>
+        </p:spPr>
+        <p:style>
+          <a:lnRef idx="2">
+            <a:schemeClr val="accent1">
+              <a:shade val="50000"/>
+            </a:schemeClr>
+          </a:lnRef>
+          <a:fillRef idx="1">
+            <a:schemeClr val="accent1"/>
+          </a:fillRef>
+          <a:effectRef idx="0">
+            <a:schemeClr val="accent1"/>
+          </a:effectRef>
+          <a:fontRef idx="minor">
+            <a:schemeClr val="lt1"/>
+          </a:fontRef>
+        </p:style>
+        <p:txBody>
+          <a:bodyPr rtlCol="0" anchor="ctr"/>
+          <a:lstStyle/>
+          <a:p>
+            <a:pPr algn="ctr"/>
+            <a:endParaRPr lang="en-US"/>
+          </a:p>
+        </p:txBody>
+      </p:sp>
+      <p:sp>
+        <p:nvSpPr>
+          <p:cNvPr id="24" name="TextBox 23">
+            <a:extLst>
+              <a:ext uri="{FF2B5EF4-FFF2-40B4-BE49-F238E27FC236}">
+                <a16:creationId xmlns:a16="http://schemas.microsoft.com/office/drawing/2014/main" id="{2BEC0393-7A30-4223-9E42-E1BD1CDBBB5B}"/>
+              </a:ext>
+            </a:extLst>
+          </p:cNvPr>
+          <p:cNvSpPr txBox="1"/>
+          <p:nvPr/>
+        </p:nvSpPr>
+        <p:spPr>
+          <a:xfrm>
+            <a:off x="5768622" y="3451582"/>
+            <a:ext cx="327378" cy="369332"/>
+          </a:xfrm>
+          <a:prstGeom prst="rect">
+            <a:avLst/>
+          </a:prstGeom>
+          <a:noFill/>
+        </p:spPr>
+        <p:txBody>
+          <a:bodyPr wrap="square" rtlCol="0">
+            <a:spAutoFit/>
+          </a:bodyPr>
+          <a:lstStyle/>
+          <a:p>
+            <a:r>
+              <a:rPr lang="en-US" dirty="0"/>
+              <a:t>z</a:t>
+            </a:r>
+          </a:p>
+        </p:txBody>
+      </p:sp>
+      <p:sp>
+        <p:nvSpPr>
+          <p:cNvPr id="2" name="TextBox 1">
+            <a:extLst>
+              <a:ext uri="{FF2B5EF4-FFF2-40B4-BE49-F238E27FC236}">
+                <a16:creationId xmlns:a16="http://schemas.microsoft.com/office/drawing/2014/main" id="{B23CEDC6-6B4F-457B-B22A-13A323FEBDF3}"/>
+              </a:ext>
+            </a:extLst>
+          </p:cNvPr>
+          <p:cNvSpPr txBox="1"/>
+          <p:nvPr/>
+        </p:nvSpPr>
+        <p:spPr>
+          <a:xfrm>
+            <a:off x="1000834" y="2235864"/>
+            <a:ext cx="3824915" cy="3170099"/>
+          </a:xfrm>
+          <a:prstGeom prst="rect">
+            <a:avLst/>
+          </a:prstGeom>
+          <a:noFill/>
+        </p:spPr>
+        <p:txBody>
+          <a:bodyPr wrap="square" rtlCol="0">
+            <a:spAutoFit/>
+          </a:bodyPr>
+          <a:lstStyle/>
+          <a:p>
+            <a:pPr marL="285750" indent="-285750">
+              <a:buFont typeface="Arial" panose="020B0604020202020204" pitchFamily="34" charset="0"/>
+              <a:buChar char="•"/>
+            </a:pPr>
+            <a:r>
+              <a:rPr lang="en-US" sz="2000" dirty="0"/>
+              <a:t>Quantum averages should (hopefully) match up with classical prediction</a:t>
+            </a:r>
+          </a:p>
+          <a:p>
+            <a:pPr marL="285750" indent="-285750">
+              <a:buFont typeface="Arial" panose="020B0604020202020204" pitchFamily="34" charset="0"/>
+              <a:buChar char="•"/>
+            </a:pPr>
+            <a:r>
+              <a:rPr lang="en-US" sz="2000" dirty="0"/>
+              <a:t>Must be able to evolve through very different materials (Pb superconductor is simple compared to </a:t>
+            </a:r>
+            <a:r>
+              <a:rPr lang="en-US" sz="2000" dirty="0" err="1"/>
+              <a:t>Metglas</a:t>
+            </a:r>
+            <a:r>
+              <a:rPr lang="en-US" sz="2000" dirty="0"/>
+              <a:t>)</a:t>
+            </a:r>
+          </a:p>
+          <a:p>
+            <a:pPr marL="285750" indent="-285750">
+              <a:buFont typeface="Arial" panose="020B0604020202020204" pitchFamily="34" charset="0"/>
+              <a:buChar char="•"/>
+            </a:pPr>
+            <a:r>
+              <a:rPr lang="en-US" sz="2000" dirty="0"/>
+              <a:t>Default geometry used by simulation shown to the right (easily respecified)</a:t>
+            </a:r>
           </a:p>
         </p:txBody>
       </p:sp>
     </p:spTree>
     <p:extLst>
       <p:ext uri="{BB962C8B-B14F-4D97-AF65-F5344CB8AC3E}">
-        <p14:creationId xmlns:p14="http://schemas.microsoft.com/office/powerpoint/2010/main" val="1076273856"/>
+        <p14:creationId xmlns:p14="http://schemas.microsoft.com/office/powerpoint/2010/main" val="3556059905"/>
       </p:ext>
     </p:extLst>
   </p:cSld>
@@ -4433,12 +5692,104 @@
           <a:chExt cx="0" cy="0"/>
         </a:xfrm>
       </p:grpSpPr>
+      <p:sp>
+        <p:nvSpPr>
+          <p:cNvPr id="2" name="Title 1">
+            <a:extLst>
+              <a:ext uri="{FF2B5EF4-FFF2-40B4-BE49-F238E27FC236}">
+                <a16:creationId xmlns:a16="http://schemas.microsoft.com/office/drawing/2014/main" id="{9B3815D8-977F-4E0B-92AA-31C36279C322}"/>
+              </a:ext>
+            </a:extLst>
+          </p:cNvPr>
+          <p:cNvSpPr>
+            <a:spLocks noGrp="1"/>
+          </p:cNvSpPr>
+          <p:nvPr>
+            <p:ph type="title"/>
+          </p:nvPr>
+        </p:nvSpPr>
+        <p:spPr>
+          <a:xfrm>
+            <a:off x="838200" y="335597"/>
+            <a:ext cx="10515600" cy="789305"/>
+          </a:xfrm>
+        </p:spPr>
+        <p:txBody>
+          <a:bodyPr>
+            <a:normAutofit/>
+          </a:bodyPr>
+          <a:lstStyle/>
+          <a:p>
+            <a:r>
+              <a:rPr lang="en-US" sz="3200" dirty="0"/>
+              <a:t>Classical Model using Bloch Equation</a:t>
+            </a:r>
+          </a:p>
+        </p:txBody>
+      </p:sp>
+      <p:sp>
+        <p:nvSpPr>
+          <p:cNvPr id="4" name="Footer Placeholder 3">
+            <a:extLst>
+              <a:ext uri="{FF2B5EF4-FFF2-40B4-BE49-F238E27FC236}">
+                <a16:creationId xmlns:a16="http://schemas.microsoft.com/office/drawing/2014/main" id="{4409C9DF-224F-4C45-9111-289AECD1CF44}"/>
+              </a:ext>
+            </a:extLst>
+          </p:cNvPr>
+          <p:cNvSpPr>
+            <a:spLocks noGrp="1"/>
+          </p:cNvSpPr>
+          <p:nvPr>
+            <p:ph type="ftr" sz="quarter" idx="11"/>
+          </p:nvPr>
+        </p:nvSpPr>
+        <p:spPr/>
+        <p:txBody>
+          <a:bodyPr/>
+          <a:lstStyle/>
+          <a:p>
+            <a:r>
+              <a:rPr lang="en-US"/>
+              <a:t>https://github.com/erfz/pt-experiment</a:t>
+            </a:r>
+          </a:p>
+        </p:txBody>
+      </p:sp>
+      <p:sp>
+        <p:nvSpPr>
+          <p:cNvPr id="5" name="Slide Number Placeholder 4">
+            <a:extLst>
+              <a:ext uri="{FF2B5EF4-FFF2-40B4-BE49-F238E27FC236}">
+                <a16:creationId xmlns:a16="http://schemas.microsoft.com/office/drawing/2014/main" id="{CA27BB3E-2B05-484B-8E44-CC8555EEB2A0}"/>
+              </a:ext>
+            </a:extLst>
+          </p:cNvPr>
+          <p:cNvSpPr>
+            <a:spLocks noGrp="1"/>
+          </p:cNvSpPr>
+          <p:nvPr>
+            <p:ph type="sldNum" sz="quarter" idx="12"/>
+          </p:nvPr>
+        </p:nvSpPr>
+        <p:spPr/>
+        <p:txBody>
+          <a:bodyPr/>
+          <a:lstStyle/>
+          <a:p>
+            <a:fld id="{92B06790-5D7A-46E6-89FE-8F323915C98E}" type="slidenum">
+              <a:rPr lang="en-US" smtClean="0"/>
+              <a:t>3</a:t>
+            </a:fld>
+            <a:endParaRPr lang="en-US"/>
+          </a:p>
+        </p:txBody>
+      </p:sp>
       <p:pic>
         <p:nvPicPr>
-          <p:cNvPr id="9" name="Picture 8" descr="Chart, line chart&#10;&#10;Description automatically generated">
-            <a:extLst>
-              <a:ext uri="{FF2B5EF4-FFF2-40B4-BE49-F238E27FC236}">
-                <a16:creationId xmlns:a16="http://schemas.microsoft.com/office/drawing/2014/main" id="{31EABE83-1A77-4AD9-A108-A6A68ED9AEFA}"/>
+          <p:cNvPr id="6" name="Picture 5" descr="Text, whiteboard&#10;&#10;Description automatically generated">
+            <a:extLst>
+              <a:ext uri="{FF2B5EF4-FFF2-40B4-BE49-F238E27FC236}">
+                <a16:creationId xmlns:a16="http://schemas.microsoft.com/office/drawing/2014/main" id="{E08E7BE5-9E43-4205-8C79-F1CF77DF8461}"/>
               </a:ext>
             </a:extLst>
           </p:cNvPr>
@@ -4448,21 +5799,15 @@
           <p:nvPr/>
         </p:nvPicPr>
         <p:blipFill>
-          <a:blip r:embed="rId3">
-            <a:extLst>
-              <a:ext uri="{28A0092B-C50C-407E-A947-70E740481C1C}">
-                <a14:useLocalDpi xmlns:a14="http://schemas.microsoft.com/office/drawing/2010/main" val="0"/>
-              </a:ext>
-            </a:extLst>
-          </a:blip>
+          <a:blip r:embed="rId2"/>
           <a:stretch>
             <a:fillRect/>
           </a:stretch>
         </p:blipFill>
         <p:spPr>
           <a:xfrm>
-            <a:off x="2561446" y="191061"/>
-            <a:ext cx="7069108" cy="5301831"/>
+            <a:off x="2299756" y="1714039"/>
+            <a:ext cx="7592485" cy="2372056"/>
           </a:xfrm>
           <a:prstGeom prst="rect">
             <a:avLst/>
@@ -4471,10 +5816,10 @@
       </p:pic>
       <p:sp>
         <p:nvSpPr>
-          <p:cNvPr id="2" name="TextBox 1">
-            <a:extLst>
-              <a:ext uri="{FF2B5EF4-FFF2-40B4-BE49-F238E27FC236}">
-                <a16:creationId xmlns:a16="http://schemas.microsoft.com/office/drawing/2014/main" id="{9835A4A8-E686-403A-B885-F327F4BD87F0}"/>
+          <p:cNvPr id="10" name="TextBox 9">
+            <a:extLst>
+              <a:ext uri="{FF2B5EF4-FFF2-40B4-BE49-F238E27FC236}">
+                <a16:creationId xmlns:a16="http://schemas.microsoft.com/office/drawing/2014/main" id="{28A6A0CF-8B6E-434C-99EC-81E4E1CCEB8F}"/>
               </a:ext>
             </a:extLst>
           </p:cNvPr>
@@ -4483,8 +5828,8 @@
         </p:nvSpPr>
         <p:spPr>
           <a:xfrm>
-            <a:off x="5071250" y="5663011"/>
-            <a:ext cx="2049500" cy="523220"/>
+            <a:off x="2689672" y="4675232"/>
+            <a:ext cx="6812652" cy="1323439"/>
           </a:xfrm>
           <a:prstGeom prst="rect">
             <a:avLst/>
@@ -4497,85 +5842,57 @@
           </a:bodyPr>
           <a:lstStyle/>
           <a:p>
-            <a:r>
-              <a:rPr lang="en-US" sz="1400" dirty="0"/>
-              <a:t>Hx = 10 </a:t>
-            </a:r>
-            <a:r>
-              <a:rPr lang="en-US" sz="1400" dirty="0" err="1"/>
-              <a:t>nT</a:t>
-            </a:r>
-            <a:endParaRPr lang="en-US" sz="1400" dirty="0"/>
-          </a:p>
-          <a:p>
-            <a:r>
-              <a:rPr lang="en-US" sz="1400" dirty="0"/>
-              <a:t>Simulated for: 20 seconds</a:t>
-            </a:r>
-          </a:p>
-        </p:txBody>
-      </p:sp>
-      <p:sp>
-        <p:nvSpPr>
-          <p:cNvPr id="5" name="Footer Placeholder 4">
-            <a:extLst>
-              <a:ext uri="{FF2B5EF4-FFF2-40B4-BE49-F238E27FC236}">
-                <a16:creationId xmlns:a16="http://schemas.microsoft.com/office/drawing/2014/main" id="{ABFDEFA1-67C6-46F7-ACD2-E61B3A2AB0D4}"/>
-              </a:ext>
-            </a:extLst>
-          </p:cNvPr>
-          <p:cNvSpPr>
-            <a:spLocks noGrp="1"/>
-          </p:cNvSpPr>
-          <p:nvPr>
-            <p:ph type="ftr" sz="quarter" idx="11"/>
-          </p:nvPr>
-        </p:nvSpPr>
-        <p:spPr/>
-        <p:txBody>
-          <a:bodyPr/>
-          <a:lstStyle/>
-          <a:p>
-            <a:r>
-              <a:rPr lang="en-US"/>
-              <a:t>https://github.com/erfz/pt-experiment</a:t>
-            </a:r>
-          </a:p>
-        </p:txBody>
-      </p:sp>
-      <p:sp>
-        <p:nvSpPr>
-          <p:cNvPr id="6" name="Slide Number Placeholder 5">
-            <a:extLst>
-              <a:ext uri="{FF2B5EF4-FFF2-40B4-BE49-F238E27FC236}">
-                <a16:creationId xmlns:a16="http://schemas.microsoft.com/office/drawing/2014/main" id="{A8FBE240-1A8B-41A3-9D18-A4A589EA770E}"/>
-              </a:ext>
-            </a:extLst>
-          </p:cNvPr>
-          <p:cNvSpPr>
-            <a:spLocks noGrp="1"/>
-          </p:cNvSpPr>
-          <p:nvPr>
-            <p:ph type="sldNum" sz="quarter" idx="12"/>
-          </p:nvPr>
-        </p:nvSpPr>
-        <p:spPr/>
-        <p:txBody>
-          <a:bodyPr/>
-          <a:lstStyle/>
-          <a:p>
-            <a:fld id="{92B06790-5D7A-46E6-89FE-8F323915C98E}" type="slidenum">
-              <a:rPr lang="en-US" smtClean="0"/>
-              <a:t>3</a:t>
-            </a:fld>
-            <a:endParaRPr lang="en-US"/>
+            <a:pPr marL="457200" indent="-457200">
+              <a:buFont typeface="Arial" panose="020B0604020202020204" pitchFamily="34" charset="0"/>
+              <a:buChar char="•"/>
+            </a:pPr>
+            <a:r>
+              <a:rPr lang="en-US" sz="2000" dirty="0"/>
+              <a:t>Currently evolved using SciPy’s </a:t>
+            </a:r>
+            <a:r>
+              <a:rPr lang="en-US" sz="2000" dirty="0" err="1"/>
+              <a:t>solve_ivp</a:t>
+            </a:r>
+            <a:r>
+              <a:rPr lang="en-US" sz="2000" dirty="0"/>
+              <a:t> (using LSODA method)</a:t>
+            </a:r>
+          </a:p>
+          <a:p>
+            <a:pPr marL="457200" indent="-457200">
+              <a:buFont typeface="Arial" panose="020B0604020202020204" pitchFamily="34" charset="0"/>
+              <a:buChar char="•"/>
+            </a:pPr>
+            <a:r>
+              <a:rPr lang="en-US" sz="2000" dirty="0"/>
+              <a:t>Relative and absolute tolerances of 1e-8 seem to work well</a:t>
+            </a:r>
+          </a:p>
+          <a:p>
+            <a:pPr marL="457200" indent="-457200">
+              <a:buFont typeface="Arial" panose="020B0604020202020204" pitchFamily="34" charset="0"/>
+              <a:buChar char="•"/>
+            </a:pPr>
+            <a:r>
+              <a:rPr lang="en-US" sz="2000" dirty="0"/>
+              <a:t>Runge-</a:t>
+            </a:r>
+            <a:r>
+              <a:rPr lang="en-US" sz="2000" dirty="0" err="1"/>
+              <a:t>Kutta</a:t>
+            </a:r>
+            <a:r>
+              <a:rPr lang="en-US" sz="2000" dirty="0"/>
+              <a:t> (RK45 and DOP853) work as well, albeit slower</a:t>
+            </a:r>
           </a:p>
         </p:txBody>
       </p:sp>
     </p:spTree>
     <p:extLst>
       <p:ext uri="{BB962C8B-B14F-4D97-AF65-F5344CB8AC3E}">
-        <p14:creationId xmlns:p14="http://schemas.microsoft.com/office/powerpoint/2010/main" val="3654465373"/>
+        <p14:creationId xmlns:p14="http://schemas.microsoft.com/office/powerpoint/2010/main" val="533000385"/>
       </p:ext>
     </p:extLst>
   </p:cSld>
@@ -4607,7 +5924,7 @@
           <p:cNvPr id="5" name="Graphic 4">
             <a:extLst>
               <a:ext uri="{FF2B5EF4-FFF2-40B4-BE49-F238E27FC236}">
-                <a16:creationId xmlns:a16="http://schemas.microsoft.com/office/drawing/2014/main" id="{D30D6E69-E27B-43C3-B1F9-CE900A4E504C}"/>
+                <a16:creationId xmlns:a16="http://schemas.microsoft.com/office/drawing/2014/main" id="{282CE5F3-C380-45C1-A229-0E4C03076725}"/>
               </a:ext>
             </a:extLst>
           </p:cNvPr>
@@ -4633,69 +5950,30 @@
         </p:blipFill>
         <p:spPr>
           <a:xfrm>
-            <a:off x="6096000" y="1652179"/>
-            <a:ext cx="5345644" cy="3556987"/>
+            <a:off x="3155495" y="1092230"/>
+            <a:ext cx="5881010" cy="3854595"/>
           </a:xfrm>
           <a:prstGeom prst="rect">
             <a:avLst/>
           </a:prstGeom>
         </p:spPr>
       </p:pic>
-      <p:pic>
-        <p:nvPicPr>
-          <p:cNvPr id="7" name="Graphic 6">
-            <a:extLst>
-              <a:ext uri="{FF2B5EF4-FFF2-40B4-BE49-F238E27FC236}">
-                <a16:creationId xmlns:a16="http://schemas.microsoft.com/office/drawing/2014/main" id="{6AEAE269-24DE-43B2-8D03-8E29179E9EC1}"/>
-              </a:ext>
-            </a:extLst>
-          </p:cNvPr>
-          <p:cNvPicPr>
-            <a:picLocks noChangeAspect="1"/>
-          </p:cNvPicPr>
+      <p:sp>
+        <p:nvSpPr>
+          <p:cNvPr id="6" name="TextBox 5">
+            <a:extLst>
+              <a:ext uri="{FF2B5EF4-FFF2-40B4-BE49-F238E27FC236}">
+                <a16:creationId xmlns:a16="http://schemas.microsoft.com/office/drawing/2014/main" id="{C08D09DA-C28E-4E3A-8581-44723F09F193}"/>
+              </a:ext>
+            </a:extLst>
+          </p:cNvPr>
+          <p:cNvSpPr txBox="1"/>
           <p:nvPr/>
-        </p:nvPicPr>
-        <p:blipFill>
-          <a:blip r:embed="rId5">
-            <a:extLst>
-              <a:ext uri="{28A0092B-C50C-407E-A947-70E740481C1C}">
-                <a14:useLocalDpi xmlns:a14="http://schemas.microsoft.com/office/drawing/2010/main" val="0"/>
-              </a:ext>
-              <a:ext uri="{96DAC541-7B7A-43D3-8B79-37D633B846F1}">
-                <asvg:svgBlip xmlns:asvg="http://schemas.microsoft.com/office/drawing/2016/SVG/main" r:embed="rId6"/>
-              </a:ext>
-            </a:extLst>
-          </a:blip>
-          <a:stretch>
-            <a:fillRect/>
-          </a:stretch>
-        </p:blipFill>
+        </p:nvSpPr>
         <p:spPr>
           <a:xfrm>
-            <a:off x="262465" y="1652179"/>
-            <a:ext cx="5421843" cy="3553642"/>
-          </a:xfrm>
-          <a:prstGeom prst="rect">
-            <a:avLst/>
-          </a:prstGeom>
-        </p:spPr>
-      </p:pic>
-      <p:sp>
-        <p:nvSpPr>
-          <p:cNvPr id="8" name="TextBox 7">
-            <a:extLst>
-              <a:ext uri="{FF2B5EF4-FFF2-40B4-BE49-F238E27FC236}">
-                <a16:creationId xmlns:a16="http://schemas.microsoft.com/office/drawing/2014/main" id="{C15D5770-3473-4451-941F-2BF8648BBF63}"/>
-              </a:ext>
-            </a:extLst>
-          </p:cNvPr>
-          <p:cNvSpPr txBox="1"/>
-          <p:nvPr/>
-        </p:nvSpPr>
-        <p:spPr>
-          <a:xfrm>
-            <a:off x="3618088" y="507804"/>
-            <a:ext cx="4955823" cy="954107"/>
+            <a:off x="3713935" y="4989868"/>
+            <a:ext cx="5322570" cy="1323439"/>
           </a:xfrm>
           <a:prstGeom prst="rect">
             <a:avLst/>
@@ -4709,36 +5987,99 @@
           <a:lstStyle/>
           <a:p>
             <a:r>
-              <a:rPr lang="en-US" sz="1400" dirty="0"/>
-              <a:t>Position: traveling along y = 4.5 cm</a:t>
-            </a:r>
-          </a:p>
-          <a:p>
-            <a:r>
-              <a:rPr lang="en-US" sz="1400" dirty="0"/>
-              <a:t>Wire separation: 5 cm (one at y = 2.5 cm, the other at y = -2.5 cm)</a:t>
-            </a:r>
-          </a:p>
-          <a:p>
-            <a:r>
-              <a:rPr lang="en-US" sz="1400" dirty="0"/>
-              <a:t>Top wire: 0.3 A</a:t>
-            </a:r>
-          </a:p>
-          <a:p>
-            <a:r>
-              <a:rPr lang="en-US" sz="1400" dirty="0"/>
-              <a:t>Bottom wire: 0.3 A</a:t>
-            </a:r>
-          </a:p>
-        </p:txBody>
-      </p:sp>
-      <p:sp>
-        <p:nvSpPr>
-          <p:cNvPr id="9" name="TextBox 8">
-            <a:extLst>
-              <a:ext uri="{FF2B5EF4-FFF2-40B4-BE49-F238E27FC236}">
-                <a16:creationId xmlns:a16="http://schemas.microsoft.com/office/drawing/2014/main" id="{89017BA5-FB0F-4ADE-B4DD-8B12E3D542E4}"/>
+              <a:rPr lang="en-US" sz="1600" dirty="0"/>
+              <a:t>Final spin: [0.0, -0.6682047135397682, 0.7439771503034246]</a:t>
+            </a:r>
+          </a:p>
+          <a:p>
+            <a:r>
+              <a:rPr lang="en-US" sz="1600" dirty="0"/>
+              <a:t>Speed: 1000 m/s</a:t>
+            </a:r>
+          </a:p>
+          <a:p>
+            <a:r>
+              <a:rPr lang="en-US" sz="1600" dirty="0"/>
+              <a:t>Wire separation: 10 m</a:t>
+            </a:r>
+          </a:p>
+          <a:p>
+            <a:r>
+              <a:rPr lang="en-US" sz="1600" dirty="0"/>
+              <a:t>Top wire: 10 A</a:t>
+            </a:r>
+          </a:p>
+          <a:p>
+            <a:r>
+              <a:rPr lang="en-US" sz="1600" dirty="0"/>
+              <a:t>Bottom wire: -10 A</a:t>
+            </a:r>
+          </a:p>
+        </p:txBody>
+      </p:sp>
+      <p:sp>
+        <p:nvSpPr>
+          <p:cNvPr id="10" name="Footer Placeholder 9">
+            <a:extLst>
+              <a:ext uri="{FF2B5EF4-FFF2-40B4-BE49-F238E27FC236}">
+                <a16:creationId xmlns:a16="http://schemas.microsoft.com/office/drawing/2014/main" id="{1F884B62-BE24-4792-A611-7E4DEB462F77}"/>
+              </a:ext>
+            </a:extLst>
+          </p:cNvPr>
+          <p:cNvSpPr>
+            <a:spLocks noGrp="1"/>
+          </p:cNvSpPr>
+          <p:nvPr>
+            <p:ph type="ftr" sz="quarter" idx="11"/>
+          </p:nvPr>
+        </p:nvSpPr>
+        <p:spPr/>
+        <p:txBody>
+          <a:bodyPr/>
+          <a:lstStyle/>
+          <a:p>
+            <a:r>
+              <a:rPr lang="en-US"/>
+              <a:t>https://github.com/erfz/pt-experiment</a:t>
+            </a:r>
+          </a:p>
+        </p:txBody>
+      </p:sp>
+      <p:sp>
+        <p:nvSpPr>
+          <p:cNvPr id="11" name="Slide Number Placeholder 10">
+            <a:extLst>
+              <a:ext uri="{FF2B5EF4-FFF2-40B4-BE49-F238E27FC236}">
+                <a16:creationId xmlns:a16="http://schemas.microsoft.com/office/drawing/2014/main" id="{947715D9-30A5-4227-A50A-21B68184C050}"/>
+              </a:ext>
+            </a:extLst>
+          </p:cNvPr>
+          <p:cNvSpPr>
+            <a:spLocks noGrp="1"/>
+          </p:cNvSpPr>
+          <p:nvPr>
+            <p:ph type="sldNum" sz="quarter" idx="12"/>
+          </p:nvPr>
+        </p:nvSpPr>
+        <p:spPr/>
+        <p:txBody>
+          <a:bodyPr/>
+          <a:lstStyle/>
+          <a:p>
+            <a:fld id="{92B06790-5D7A-46E6-89FE-8F323915C98E}" type="slidenum">
+              <a:rPr lang="en-US" smtClean="0"/>
+              <a:t>4</a:t>
+            </a:fld>
+            <a:endParaRPr lang="en-US"/>
+          </a:p>
+        </p:txBody>
+      </p:sp>
+      <p:sp>
+        <p:nvSpPr>
+          <p:cNvPr id="2" name="TextBox 1">
+            <a:extLst>
+              <a:ext uri="{FF2B5EF4-FFF2-40B4-BE49-F238E27FC236}">
+                <a16:creationId xmlns:a16="http://schemas.microsoft.com/office/drawing/2014/main" id="{8FF0A296-46B8-4AA4-9298-4F5DC4D75E50}"/>
               </a:ext>
             </a:extLst>
           </p:cNvPr>
@@ -4747,8 +6088,8 @@
         </p:nvSpPr>
         <p:spPr>
           <a:xfrm>
-            <a:off x="835378" y="5396089"/>
-            <a:ext cx="4848930" cy="738664"/>
+            <a:off x="2930480" y="449023"/>
+            <a:ext cx="6331040" cy="523220"/>
           </a:xfrm>
           <a:prstGeom prst="rect">
             <a:avLst/>
@@ -4762,120 +6103,18 @@
           <a:lstStyle/>
           <a:p>
             <a:r>
-              <a:rPr lang="en-US" sz="1400" dirty="0"/>
-              <a:t>Speed = 5 m/s</a:t>
-            </a:r>
-          </a:p>
-          <a:p>
-            <a:r>
-              <a:rPr lang="en-US" sz="1400" dirty="0"/>
-              <a:t>Final spin: [-0.08735400424031332, 0.9931222835729916, 0.07795298299791759]</a:t>
-            </a:r>
-          </a:p>
-        </p:txBody>
-      </p:sp>
-      <p:sp>
-        <p:nvSpPr>
-          <p:cNvPr id="11" name="TextBox 10">
-            <a:extLst>
-              <a:ext uri="{FF2B5EF4-FFF2-40B4-BE49-F238E27FC236}">
-                <a16:creationId xmlns:a16="http://schemas.microsoft.com/office/drawing/2014/main" id="{484A53A4-9FD4-4D50-82BD-7FC164478881}"/>
-              </a:ext>
-            </a:extLst>
-          </p:cNvPr>
-          <p:cNvSpPr txBox="1"/>
-          <p:nvPr/>
-        </p:nvSpPr>
-        <p:spPr>
-          <a:xfrm>
-            <a:off x="6507692" y="5396089"/>
-            <a:ext cx="4848930" cy="738664"/>
-          </a:xfrm>
-          <a:prstGeom prst="rect">
-            <a:avLst/>
-          </a:prstGeom>
-          <a:noFill/>
-        </p:spPr>
-        <p:txBody>
-          <a:bodyPr wrap="square" rtlCol="0">
-            <a:spAutoFit/>
-          </a:bodyPr>
-          <a:lstStyle/>
-          <a:p>
-            <a:r>
-              <a:rPr lang="en-US" sz="1400" dirty="0"/>
-              <a:t>Speed = 100 m/s</a:t>
-            </a:r>
-          </a:p>
-          <a:p>
-            <a:r>
-              <a:rPr lang="en-US" sz="1400" dirty="0"/>
-              <a:t>Final spin: [0.33223344714498293, -0.7801738237958111, -0.5300469683788319] </a:t>
-            </a:r>
-          </a:p>
-        </p:txBody>
-      </p:sp>
-      <p:sp>
-        <p:nvSpPr>
-          <p:cNvPr id="14" name="Footer Placeholder 13">
-            <a:extLst>
-              <a:ext uri="{FF2B5EF4-FFF2-40B4-BE49-F238E27FC236}">
-                <a16:creationId xmlns:a16="http://schemas.microsoft.com/office/drawing/2014/main" id="{42E99B0D-9392-446B-B7FD-4F3814CD510D}"/>
-              </a:ext>
-            </a:extLst>
-          </p:cNvPr>
-          <p:cNvSpPr>
-            <a:spLocks noGrp="1"/>
-          </p:cNvSpPr>
-          <p:nvPr>
-            <p:ph type="ftr" sz="quarter" idx="11"/>
-          </p:nvPr>
-        </p:nvSpPr>
-        <p:spPr/>
-        <p:txBody>
-          <a:bodyPr/>
-          <a:lstStyle/>
-          <a:p>
-            <a:r>
-              <a:rPr lang="en-US"/>
-              <a:t>https://github.com/erfz/pt-experiment</a:t>
-            </a:r>
-          </a:p>
-        </p:txBody>
-      </p:sp>
-      <p:sp>
-        <p:nvSpPr>
-          <p:cNvPr id="15" name="Slide Number Placeholder 14">
-            <a:extLst>
-              <a:ext uri="{FF2B5EF4-FFF2-40B4-BE49-F238E27FC236}">
-                <a16:creationId xmlns:a16="http://schemas.microsoft.com/office/drawing/2014/main" id="{A5B7BEAE-790E-4E33-BD3E-995136593C4B}"/>
-              </a:ext>
-            </a:extLst>
-          </p:cNvPr>
-          <p:cNvSpPr>
-            <a:spLocks noGrp="1"/>
-          </p:cNvSpPr>
-          <p:nvPr>
-            <p:ph type="sldNum" sz="quarter" idx="12"/>
-          </p:nvPr>
-        </p:nvSpPr>
-        <p:spPr/>
-        <p:txBody>
-          <a:bodyPr/>
-          <a:lstStyle/>
-          <a:p>
-            <a:fld id="{92B06790-5D7A-46E6-89FE-8F323915C98E}" type="slidenum">
-              <a:rPr lang="en-US" smtClean="0"/>
-              <a:t>4</a:t>
-            </a:fld>
-            <a:endParaRPr lang="en-US" dirty="0"/>
+              <a:rPr lang="en-US" sz="2800" dirty="0">
+                <a:latin typeface="+mj-lt"/>
+              </a:rPr>
+              <a:t>Simulation of particle passing by two wires</a:t>
+            </a:r>
           </a:p>
         </p:txBody>
       </p:sp>
     </p:spTree>
     <p:extLst>
       <p:ext uri="{BB962C8B-B14F-4D97-AF65-F5344CB8AC3E}">
-        <p14:creationId xmlns:p14="http://schemas.microsoft.com/office/powerpoint/2010/main" val="2488020001"/>
+        <p14:creationId xmlns:p14="http://schemas.microsoft.com/office/powerpoint/2010/main" val="1724081649"/>
       </p:ext>
     </p:extLst>
   </p:cSld>
@@ -4907,7 +6146,7 @@
           <p:cNvPr id="5" name="Graphic 4">
             <a:extLst>
               <a:ext uri="{FF2B5EF4-FFF2-40B4-BE49-F238E27FC236}">
-                <a16:creationId xmlns:a16="http://schemas.microsoft.com/office/drawing/2014/main" id="{02FB9825-4CF6-41C6-9EE2-CB7BC38C9970}"/>
+                <a16:creationId xmlns:a16="http://schemas.microsoft.com/office/drawing/2014/main" id="{E1378719-C7F9-448F-A03C-004BF9B367C8}"/>
               </a:ext>
             </a:extLst>
           </p:cNvPr>
@@ -4917,13 +6156,13 @@
           <p:nvPr/>
         </p:nvPicPr>
         <p:blipFill>
-          <a:blip r:embed="rId3">
+          <a:blip r:embed="rId2">
             <a:extLst>
               <a:ext uri="{28A0092B-C50C-407E-A947-70E740481C1C}">
                 <a14:useLocalDpi xmlns:a14="http://schemas.microsoft.com/office/drawing/2010/main" val="0"/>
               </a:ext>
               <a:ext uri="{96DAC541-7B7A-43D3-8B79-37D633B846F1}">
-                <asvg:svgBlip xmlns:asvg="http://schemas.microsoft.com/office/drawing/2016/SVG/main" r:embed="rId4"/>
+                <asvg:svgBlip xmlns:asvg="http://schemas.microsoft.com/office/drawing/2016/SVG/main" r:embed="rId3"/>
               </a:ext>
             </a:extLst>
           </a:blip>
@@ -4933,8 +6172,8 @@
         </p:blipFill>
         <p:spPr>
           <a:xfrm>
-            <a:off x="2566634" y="483567"/>
-            <a:ext cx="7058731" cy="4626509"/>
+            <a:off x="2925539" y="986349"/>
+            <a:ext cx="6340917" cy="4156031"/>
           </a:xfrm>
           <a:prstGeom prst="rect">
             <a:avLst/>
@@ -4946,7 +6185,7 @@
           <p:cNvPr id="6" name="TextBox 5">
             <a:extLst>
               <a:ext uri="{FF2B5EF4-FFF2-40B4-BE49-F238E27FC236}">
-                <a16:creationId xmlns:a16="http://schemas.microsoft.com/office/drawing/2014/main" id="{5C2FC86C-A87F-4A4D-B43D-74692C548139}"/>
+                <a16:creationId xmlns:a16="http://schemas.microsoft.com/office/drawing/2014/main" id="{2B66FDC6-A7BB-416C-8B27-AD79CB402731}"/>
               </a:ext>
             </a:extLst>
           </p:cNvPr>
@@ -4955,8 +6194,8 @@
         </p:nvSpPr>
         <p:spPr>
           <a:xfrm>
-            <a:off x="3499555" y="5083708"/>
-            <a:ext cx="6107289" cy="1600438"/>
+            <a:off x="2925539" y="5210756"/>
+            <a:ext cx="7105649" cy="1077218"/>
           </a:xfrm>
           <a:prstGeom prst="rect">
             <a:avLst/>
@@ -4970,72 +6209,30 @@
           <a:lstStyle/>
           <a:p>
             <a:r>
-              <a:rPr lang="en-US" sz="1400" dirty="0"/>
-              <a:t>Final spin: [0.9929377240255438, -0.09402723622844013, -0.072357613056144]</a:t>
-            </a:r>
-          </a:p>
-          <a:p>
-            <a:r>
-              <a:rPr lang="en-US" sz="1400" dirty="0" err="1"/>
-              <a:t>Metglas</a:t>
-            </a:r>
-            <a:r>
-              <a:rPr lang="en-US" sz="1400" dirty="0"/>
-              <a:t> domain field strength: 0.5 T</a:t>
-            </a:r>
-          </a:p>
-          <a:p>
-            <a:r>
-              <a:rPr lang="en-US" sz="1400" dirty="0"/>
-              <a:t>Domain dimensions: 10 </a:t>
-            </a:r>
-            <a:r>
-              <a:rPr lang="el-GR" sz="1400" dirty="0"/>
-              <a:t>μ</a:t>
-            </a:r>
-            <a:r>
-              <a:rPr lang="en-US" sz="1400" dirty="0"/>
-              <a:t>m x 10 </a:t>
-            </a:r>
-            <a:r>
-              <a:rPr lang="el-GR" sz="1400" dirty="0"/>
-              <a:t>μ</a:t>
-            </a:r>
-            <a:r>
-              <a:rPr lang="en-US" sz="1400" dirty="0"/>
-              <a:t>m</a:t>
-            </a:r>
-          </a:p>
-          <a:p>
-            <a:r>
-              <a:rPr lang="en-US" sz="1400" dirty="0"/>
-              <a:t>Speed: 100 m/s</a:t>
-            </a:r>
-          </a:p>
-          <a:p>
-            <a:r>
-              <a:rPr lang="en-US" sz="1400" dirty="0"/>
-              <a:t>Saturation: 0.82</a:t>
-            </a:r>
-          </a:p>
-          <a:p>
-            <a:r>
-              <a:rPr lang="en-US" sz="1400" dirty="0" err="1"/>
-              <a:t>Metglas</a:t>
-            </a:r>
-            <a:r>
-              <a:rPr lang="en-US" sz="1400" dirty="0"/>
-              <a:t> length: 0.1 mm</a:t>
-            </a:r>
-          </a:p>
-          <a:p>
-            <a:r>
-              <a:rPr lang="en-US" sz="1400" dirty="0" err="1"/>
-              <a:t>Metglas</a:t>
-            </a:r>
-            <a:r>
-              <a:rPr lang="en-US" sz="1400" dirty="0"/>
-              <a:t> width: 0.1 m</a:t>
+              <a:rPr lang="pt-BR" sz="1600" dirty="0"/>
+              <a:t>Field = </a:t>
+            </a:r>
+            <a:r>
+              <a:rPr lang="de-DE" sz="1600" dirty="0"/>
+              <a:t>[Hx, 0, t * H_dot] with Hx = 10 nT, H_dot = -41.5 nT/s</a:t>
+            </a:r>
+          </a:p>
+          <a:p>
+            <a:r>
+              <a:rPr lang="en-US" sz="1600" dirty="0"/>
+              <a:t>Final spin: [0.07625445246664814, 0.9970861336744352, 0.003762795417459164]</a:t>
+            </a:r>
+          </a:p>
+          <a:p>
+            <a:r>
+              <a:rPr lang="en-US" sz="1600" dirty="0"/>
+              <a:t>Corresponding realignment probability: 50.18813977087295%</a:t>
+            </a:r>
+          </a:p>
+          <a:p>
+            <a:r>
+              <a:rPr lang="en-US" sz="1600" dirty="0"/>
+              <a:t>Theoretical realignment probability: 49.97872272254392%</a:t>
             </a:r>
           </a:p>
         </p:txBody>
@@ -5045,7 +6242,7 @@
           <p:cNvPr id="9" name="Footer Placeholder 8">
             <a:extLst>
               <a:ext uri="{FF2B5EF4-FFF2-40B4-BE49-F238E27FC236}">
-                <a16:creationId xmlns:a16="http://schemas.microsoft.com/office/drawing/2014/main" id="{333C9108-14DD-4574-B595-31E7CDE371E2}"/>
+                <a16:creationId xmlns:a16="http://schemas.microsoft.com/office/drawing/2014/main" id="{3C41F966-B9D9-40F1-A015-02B6C82C62A5}"/>
               </a:ext>
             </a:extLst>
           </p:cNvPr>
@@ -5056,18 +6253,13 @@
             <p:ph type="ftr" sz="quarter" idx="11"/>
           </p:nvPr>
         </p:nvSpPr>
-        <p:spPr>
-          <a:xfrm>
-            <a:off x="6553200" y="6345389"/>
-            <a:ext cx="4114800" cy="365125"/>
-          </a:xfrm>
-        </p:spPr>
-        <p:txBody>
-          <a:bodyPr/>
-          <a:lstStyle/>
-          <a:p>
-            <a:r>
-              <a:rPr lang="en-US" dirty="0"/>
+        <p:spPr/>
+        <p:txBody>
+          <a:bodyPr/>
+          <a:lstStyle/>
+          <a:p>
+            <a:r>
+              <a:rPr lang="en-US"/>
               <a:t>https://github.com/erfz/pt-experiment</a:t>
             </a:r>
           </a:p>
@@ -5078,7 +6270,7 @@
           <p:cNvPr id="10" name="Slide Number Placeholder 9">
             <a:extLst>
               <a:ext uri="{FF2B5EF4-FFF2-40B4-BE49-F238E27FC236}">
-                <a16:creationId xmlns:a16="http://schemas.microsoft.com/office/drawing/2014/main" id="{003444D9-FEC8-4B41-90D7-4096F671E213}"/>
+                <a16:creationId xmlns:a16="http://schemas.microsoft.com/office/drawing/2014/main" id="{362420F0-6716-4777-A074-657B58F1FB68}"/>
               </a:ext>
             </a:extLst>
           </p:cNvPr>
@@ -5102,10 +6294,59 @@
           </a:p>
         </p:txBody>
       </p:sp>
+      <p:sp>
+        <p:nvSpPr>
+          <p:cNvPr id="7" name="TextBox 6">
+            <a:extLst>
+              <a:ext uri="{FF2B5EF4-FFF2-40B4-BE49-F238E27FC236}">
+                <a16:creationId xmlns:a16="http://schemas.microsoft.com/office/drawing/2014/main" id="{1EE62938-1284-41D3-9BDA-6811333513E8}"/>
+              </a:ext>
+            </a:extLst>
+          </p:cNvPr>
+          <p:cNvSpPr txBox="1"/>
+          <p:nvPr/>
+        </p:nvSpPr>
+        <p:spPr>
+          <a:xfrm>
+            <a:off x="2177705" y="333198"/>
+            <a:ext cx="7836583" cy="523220"/>
+          </a:xfrm>
+          <a:prstGeom prst="rect">
+            <a:avLst/>
+          </a:prstGeom>
+          <a:noFill/>
+        </p:spPr>
+        <p:txBody>
+          <a:bodyPr wrap="square" rtlCol="0">
+            <a:spAutoFit/>
+          </a:bodyPr>
+          <a:lstStyle/>
+          <a:p>
+            <a:r>
+              <a:rPr lang="en-US" sz="2800" dirty="0">
+                <a:latin typeface="+mj-lt"/>
+              </a:rPr>
+              <a:t>Simulation of particle evolving under </a:t>
+            </a:r>
+            <a:r>
+              <a:rPr lang="en-US" sz="2800" dirty="0" err="1">
+                <a:latin typeface="+mj-lt"/>
+              </a:rPr>
+              <a:t>Vladimirskii</a:t>
+            </a:r>
+            <a:r>
+              <a:rPr lang="en-US" sz="2800" dirty="0">
+                <a:latin typeface="+mj-lt"/>
+              </a:rPr>
+              <a:t> field</a:t>
+            </a:r>
+          </a:p>
+        </p:txBody>
+      </p:sp>
     </p:spTree>
     <p:extLst>
       <p:ext uri="{BB962C8B-B14F-4D97-AF65-F5344CB8AC3E}">
-        <p14:creationId xmlns:p14="http://schemas.microsoft.com/office/powerpoint/2010/main" val="3960618021"/>
+        <p14:creationId xmlns:p14="http://schemas.microsoft.com/office/powerpoint/2010/main" val="1076273856"/>
       </p:ext>
     </p:extLst>
   </p:cSld>
@@ -5134,10 +6375,10 @@
       </p:grpSpPr>
       <p:pic>
         <p:nvPicPr>
-          <p:cNvPr id="5" name="Graphic 4">
-            <a:extLst>
-              <a:ext uri="{FF2B5EF4-FFF2-40B4-BE49-F238E27FC236}">
-                <a16:creationId xmlns:a16="http://schemas.microsoft.com/office/drawing/2014/main" id="{291D6174-8DCB-4694-966F-98A29C7B6234}"/>
+          <p:cNvPr id="9" name="Picture 8" descr="Chart, line chart&#10;&#10;Description automatically generated">
+            <a:extLst>
+              <a:ext uri="{FF2B5EF4-FFF2-40B4-BE49-F238E27FC236}">
+                <a16:creationId xmlns:a16="http://schemas.microsoft.com/office/drawing/2014/main" id="{31EABE83-1A77-4AD9-A108-A6A68ED9AEFA}"/>
               </a:ext>
             </a:extLst>
           </p:cNvPr>
@@ -5147,13 +6388,10 @@
           <p:nvPr/>
         </p:nvPicPr>
         <p:blipFill>
-          <a:blip r:embed="rId2">
+          <a:blip r:embed="rId3">
             <a:extLst>
               <a:ext uri="{28A0092B-C50C-407E-A947-70E740481C1C}">
                 <a14:useLocalDpi xmlns:a14="http://schemas.microsoft.com/office/drawing/2010/main" val="0"/>
-              </a:ext>
-              <a:ext uri="{96DAC541-7B7A-43D3-8B79-37D633B846F1}">
-                <asvg:svgBlip xmlns:asvg="http://schemas.microsoft.com/office/drawing/2016/SVG/main" r:embed="rId3"/>
               </a:ext>
             </a:extLst>
           </a:blip>
@@ -5163,8 +6401,8 @@
         </p:blipFill>
         <p:spPr>
           <a:xfrm>
-            <a:off x="1971983" y="626270"/>
-            <a:ext cx="8248033" cy="5605459"/>
+            <a:off x="2561446" y="191061"/>
+            <a:ext cx="7069108" cy="5301831"/>
           </a:xfrm>
           <a:prstGeom prst="rect">
             <a:avLst/>
@@ -5173,10 +6411,56 @@
       </p:pic>
       <p:sp>
         <p:nvSpPr>
-          <p:cNvPr id="8" name="Footer Placeholder 7">
-            <a:extLst>
-              <a:ext uri="{FF2B5EF4-FFF2-40B4-BE49-F238E27FC236}">
-                <a16:creationId xmlns:a16="http://schemas.microsoft.com/office/drawing/2014/main" id="{B52228D7-140D-4E38-B925-08298121A160}"/>
+          <p:cNvPr id="2" name="TextBox 1">
+            <a:extLst>
+              <a:ext uri="{FF2B5EF4-FFF2-40B4-BE49-F238E27FC236}">
+                <a16:creationId xmlns:a16="http://schemas.microsoft.com/office/drawing/2014/main" id="{9835A4A8-E686-403A-B885-F327F4BD87F0}"/>
+              </a:ext>
+            </a:extLst>
+          </p:cNvPr>
+          <p:cNvSpPr txBox="1"/>
+          <p:nvPr/>
+        </p:nvSpPr>
+        <p:spPr>
+          <a:xfrm>
+            <a:off x="4038600" y="5601455"/>
+            <a:ext cx="4114800" cy="646331"/>
+          </a:xfrm>
+          <a:prstGeom prst="rect">
+            <a:avLst/>
+          </a:prstGeom>
+          <a:noFill/>
+        </p:spPr>
+        <p:txBody>
+          <a:bodyPr wrap="square" rtlCol="0">
+            <a:spAutoFit/>
+          </a:bodyPr>
+          <a:lstStyle/>
+          <a:p>
+            <a:r>
+              <a:rPr lang="en-US" dirty="0"/>
+              <a:t>Hx = 10 </a:t>
+            </a:r>
+            <a:r>
+              <a:rPr lang="en-US" dirty="0" err="1"/>
+              <a:t>nT</a:t>
+            </a:r>
+            <a:endParaRPr lang="en-US" dirty="0"/>
+          </a:p>
+          <a:p>
+            <a:r>
+              <a:rPr lang="en-US" dirty="0"/>
+              <a:t>Simulation time at each point: 20 seconds</a:t>
+            </a:r>
+          </a:p>
+        </p:txBody>
+      </p:sp>
+      <p:sp>
+        <p:nvSpPr>
+          <p:cNvPr id="5" name="Footer Placeholder 4">
+            <a:extLst>
+              <a:ext uri="{FF2B5EF4-FFF2-40B4-BE49-F238E27FC236}">
+                <a16:creationId xmlns:a16="http://schemas.microsoft.com/office/drawing/2014/main" id="{ABFDEFA1-67C6-46F7-ACD2-E61B3A2AB0D4}"/>
               </a:ext>
             </a:extLst>
           </p:cNvPr>
@@ -5201,10 +6485,10 @@
       </p:sp>
       <p:sp>
         <p:nvSpPr>
-          <p:cNvPr id="9" name="Slide Number Placeholder 8">
-            <a:extLst>
-              <a:ext uri="{FF2B5EF4-FFF2-40B4-BE49-F238E27FC236}">
-                <a16:creationId xmlns:a16="http://schemas.microsoft.com/office/drawing/2014/main" id="{B65B2157-079E-4C92-957C-C9B9664CF329}"/>
+          <p:cNvPr id="6" name="Slide Number Placeholder 5">
+            <a:extLst>
+              <a:ext uri="{FF2B5EF4-FFF2-40B4-BE49-F238E27FC236}">
+                <a16:creationId xmlns:a16="http://schemas.microsoft.com/office/drawing/2014/main" id="{A8FBE240-1A8B-41A3-9D18-A4A589EA770E}"/>
               </a:ext>
             </a:extLst>
           </p:cNvPr>
@@ -5231,7 +6515,7 @@
     </p:spTree>
     <p:extLst>
       <p:ext uri="{BB962C8B-B14F-4D97-AF65-F5344CB8AC3E}">
-        <p14:creationId xmlns:p14="http://schemas.microsoft.com/office/powerpoint/2010/main" val="2375993115"/>
+        <p14:creationId xmlns:p14="http://schemas.microsoft.com/office/powerpoint/2010/main" val="3654465373"/>
       </p:ext>
     </p:extLst>
   </p:cSld>
@@ -5260,10 +6544,10 @@
       </p:grpSpPr>
       <p:pic>
         <p:nvPicPr>
-          <p:cNvPr id="6" name="Picture 5">
-            <a:extLst>
-              <a:ext uri="{FF2B5EF4-FFF2-40B4-BE49-F238E27FC236}">
-                <a16:creationId xmlns:a16="http://schemas.microsoft.com/office/drawing/2014/main" id="{87A65286-1D77-42F5-8E2D-7BBFA38C612C}"/>
+          <p:cNvPr id="5" name="Graphic 4">
+            <a:extLst>
+              <a:ext uri="{FF2B5EF4-FFF2-40B4-BE49-F238E27FC236}">
+                <a16:creationId xmlns:a16="http://schemas.microsoft.com/office/drawing/2014/main" id="{D30D6E69-E27B-43C3-B1F9-CE900A4E504C}"/>
               </a:ext>
             </a:extLst>
           </p:cNvPr>
@@ -5273,15 +6557,24 @@
           <p:nvPr/>
         </p:nvPicPr>
         <p:blipFill>
-          <a:blip r:embed="rId2"/>
+          <a:blip r:embed="rId3">
+            <a:extLst>
+              <a:ext uri="{28A0092B-C50C-407E-A947-70E740481C1C}">
+                <a14:useLocalDpi xmlns:a14="http://schemas.microsoft.com/office/drawing/2010/main" val="0"/>
+              </a:ext>
+              <a:ext uri="{96DAC541-7B7A-43D3-8B79-37D633B846F1}">
+                <asvg:svgBlip xmlns:asvg="http://schemas.microsoft.com/office/drawing/2016/SVG/main" r:embed="rId4"/>
+              </a:ext>
+            </a:extLst>
+          </a:blip>
           <a:stretch>
             <a:fillRect/>
           </a:stretch>
         </p:blipFill>
         <p:spPr>
           <a:xfrm>
-            <a:off x="330567" y="1581006"/>
-            <a:ext cx="5546710" cy="3695987"/>
+            <a:off x="6096000" y="1652179"/>
+            <a:ext cx="5345644" cy="3556987"/>
           </a:xfrm>
           <a:prstGeom prst="rect">
             <a:avLst/>
@@ -5290,10 +6583,500 @@
       </p:pic>
       <p:pic>
         <p:nvPicPr>
-          <p:cNvPr id="8" name="Graphic 7">
-            <a:extLst>
-              <a:ext uri="{FF2B5EF4-FFF2-40B4-BE49-F238E27FC236}">
-                <a16:creationId xmlns:a16="http://schemas.microsoft.com/office/drawing/2014/main" id="{3D124E56-8153-4DD1-AB58-1BF8C4470542}"/>
+          <p:cNvPr id="7" name="Graphic 6">
+            <a:extLst>
+              <a:ext uri="{FF2B5EF4-FFF2-40B4-BE49-F238E27FC236}">
+                <a16:creationId xmlns:a16="http://schemas.microsoft.com/office/drawing/2014/main" id="{6AEAE269-24DE-43B2-8D03-8E29179E9EC1}"/>
+              </a:ext>
+            </a:extLst>
+          </p:cNvPr>
+          <p:cNvPicPr>
+            <a:picLocks noChangeAspect="1"/>
+          </p:cNvPicPr>
+          <p:nvPr/>
+        </p:nvPicPr>
+        <p:blipFill>
+          <a:blip r:embed="rId5">
+            <a:extLst>
+              <a:ext uri="{28A0092B-C50C-407E-A947-70E740481C1C}">
+                <a14:useLocalDpi xmlns:a14="http://schemas.microsoft.com/office/drawing/2010/main" val="0"/>
+              </a:ext>
+              <a:ext uri="{96DAC541-7B7A-43D3-8B79-37D633B846F1}">
+                <asvg:svgBlip xmlns:asvg="http://schemas.microsoft.com/office/drawing/2016/SVG/main" r:embed="rId6"/>
+              </a:ext>
+            </a:extLst>
+          </a:blip>
+          <a:stretch>
+            <a:fillRect/>
+          </a:stretch>
+        </p:blipFill>
+        <p:spPr>
+          <a:xfrm>
+            <a:off x="262465" y="1652179"/>
+            <a:ext cx="5421843" cy="3553642"/>
+          </a:xfrm>
+          <a:prstGeom prst="rect">
+            <a:avLst/>
+          </a:prstGeom>
+        </p:spPr>
+      </p:pic>
+      <p:sp>
+        <p:nvSpPr>
+          <p:cNvPr id="8" name="TextBox 7">
+            <a:extLst>
+              <a:ext uri="{FF2B5EF4-FFF2-40B4-BE49-F238E27FC236}">
+                <a16:creationId xmlns:a16="http://schemas.microsoft.com/office/drawing/2014/main" id="{C15D5770-3473-4451-941F-2BF8648BBF63}"/>
+              </a:ext>
+            </a:extLst>
+          </p:cNvPr>
+          <p:cNvSpPr txBox="1"/>
+          <p:nvPr/>
+        </p:nvSpPr>
+        <p:spPr>
+          <a:xfrm>
+            <a:off x="3618088" y="694727"/>
+            <a:ext cx="4955823" cy="954107"/>
+          </a:xfrm>
+          <a:prstGeom prst="rect">
+            <a:avLst/>
+          </a:prstGeom>
+          <a:noFill/>
+        </p:spPr>
+        <p:txBody>
+          <a:bodyPr wrap="square" rtlCol="0">
+            <a:spAutoFit/>
+          </a:bodyPr>
+          <a:lstStyle/>
+          <a:p>
+            <a:r>
+              <a:rPr lang="en-US" sz="1400" dirty="0"/>
+              <a:t>Position: traveling along y = 4.5 cm</a:t>
+            </a:r>
+          </a:p>
+          <a:p>
+            <a:r>
+              <a:rPr lang="en-US" sz="1400" dirty="0"/>
+              <a:t>Wire separation: 5 cm (one at y = 2.5 cm, the other at y = -2.5 cm)</a:t>
+            </a:r>
+          </a:p>
+          <a:p>
+            <a:r>
+              <a:rPr lang="en-US" sz="1400" dirty="0"/>
+              <a:t>Top wire: 0.3 A</a:t>
+            </a:r>
+          </a:p>
+          <a:p>
+            <a:r>
+              <a:rPr lang="en-US" sz="1400" dirty="0"/>
+              <a:t>Bottom wire: 0.3 A</a:t>
+            </a:r>
+          </a:p>
+        </p:txBody>
+      </p:sp>
+      <p:sp>
+        <p:nvSpPr>
+          <p:cNvPr id="9" name="TextBox 8">
+            <a:extLst>
+              <a:ext uri="{FF2B5EF4-FFF2-40B4-BE49-F238E27FC236}">
+                <a16:creationId xmlns:a16="http://schemas.microsoft.com/office/drawing/2014/main" id="{89017BA5-FB0F-4ADE-B4DD-8B12E3D542E4}"/>
+              </a:ext>
+            </a:extLst>
+          </p:cNvPr>
+          <p:cNvSpPr txBox="1"/>
+          <p:nvPr/>
+        </p:nvSpPr>
+        <p:spPr>
+          <a:xfrm>
+            <a:off x="556259" y="5205821"/>
+            <a:ext cx="5043026" cy="830997"/>
+          </a:xfrm>
+          <a:prstGeom prst="rect">
+            <a:avLst/>
+          </a:prstGeom>
+          <a:noFill/>
+        </p:spPr>
+        <p:txBody>
+          <a:bodyPr wrap="square" rtlCol="0">
+            <a:spAutoFit/>
+          </a:bodyPr>
+          <a:lstStyle/>
+          <a:p>
+            <a:r>
+              <a:rPr lang="en-US" sz="1600" dirty="0"/>
+              <a:t>Speed = 5 m/s</a:t>
+            </a:r>
+          </a:p>
+          <a:p>
+            <a:r>
+              <a:rPr lang="en-US" sz="1600" dirty="0"/>
+              <a:t>Final spin: [-0.08735400424031332, 0.9931222835729916, 0.07795298299791759]</a:t>
+            </a:r>
+          </a:p>
+        </p:txBody>
+      </p:sp>
+      <p:sp>
+        <p:nvSpPr>
+          <p:cNvPr id="11" name="TextBox 10">
+            <a:extLst>
+              <a:ext uri="{FF2B5EF4-FFF2-40B4-BE49-F238E27FC236}">
+                <a16:creationId xmlns:a16="http://schemas.microsoft.com/office/drawing/2014/main" id="{484A53A4-9FD4-4D50-82BD-7FC164478881}"/>
+              </a:ext>
+            </a:extLst>
+          </p:cNvPr>
+          <p:cNvSpPr txBox="1"/>
+          <p:nvPr/>
+        </p:nvSpPr>
+        <p:spPr>
+          <a:xfrm>
+            <a:off x="6592715" y="5212511"/>
+            <a:ext cx="5043026" cy="830997"/>
+          </a:xfrm>
+          <a:prstGeom prst="rect">
+            <a:avLst/>
+          </a:prstGeom>
+          <a:noFill/>
+        </p:spPr>
+        <p:txBody>
+          <a:bodyPr wrap="square" rtlCol="0">
+            <a:spAutoFit/>
+          </a:bodyPr>
+          <a:lstStyle/>
+          <a:p>
+            <a:r>
+              <a:rPr lang="en-US" sz="1600" dirty="0"/>
+              <a:t>Speed = 100 m/s</a:t>
+            </a:r>
+          </a:p>
+          <a:p>
+            <a:r>
+              <a:rPr lang="en-US" sz="1600" dirty="0"/>
+              <a:t>Final spin: [0.33223344714498293, -0.7801738237958111, -0.5300469683788319] </a:t>
+            </a:r>
+          </a:p>
+        </p:txBody>
+      </p:sp>
+      <p:sp>
+        <p:nvSpPr>
+          <p:cNvPr id="14" name="Footer Placeholder 13">
+            <a:extLst>
+              <a:ext uri="{FF2B5EF4-FFF2-40B4-BE49-F238E27FC236}">
+                <a16:creationId xmlns:a16="http://schemas.microsoft.com/office/drawing/2014/main" id="{42E99B0D-9392-446B-B7FD-4F3814CD510D}"/>
+              </a:ext>
+            </a:extLst>
+          </p:cNvPr>
+          <p:cNvSpPr>
+            <a:spLocks noGrp="1"/>
+          </p:cNvSpPr>
+          <p:nvPr>
+            <p:ph type="ftr" sz="quarter" idx="11"/>
+          </p:nvPr>
+        </p:nvSpPr>
+        <p:spPr/>
+        <p:txBody>
+          <a:bodyPr/>
+          <a:lstStyle/>
+          <a:p>
+            <a:r>
+              <a:rPr lang="en-US"/>
+              <a:t>https://github.com/erfz/pt-experiment</a:t>
+            </a:r>
+          </a:p>
+        </p:txBody>
+      </p:sp>
+      <p:sp>
+        <p:nvSpPr>
+          <p:cNvPr id="15" name="Slide Number Placeholder 14">
+            <a:extLst>
+              <a:ext uri="{FF2B5EF4-FFF2-40B4-BE49-F238E27FC236}">
+                <a16:creationId xmlns:a16="http://schemas.microsoft.com/office/drawing/2014/main" id="{A5B7BEAE-790E-4E33-BD3E-995136593C4B}"/>
+              </a:ext>
+            </a:extLst>
+          </p:cNvPr>
+          <p:cNvSpPr>
+            <a:spLocks noGrp="1"/>
+          </p:cNvSpPr>
+          <p:nvPr>
+            <p:ph type="sldNum" sz="quarter" idx="12"/>
+          </p:nvPr>
+        </p:nvSpPr>
+        <p:spPr/>
+        <p:txBody>
+          <a:bodyPr/>
+          <a:lstStyle/>
+          <a:p>
+            <a:fld id="{92B06790-5D7A-46E6-89FE-8F323915C98E}" type="slidenum">
+              <a:rPr lang="en-US" smtClean="0"/>
+              <a:t>7</a:t>
+            </a:fld>
+            <a:endParaRPr lang="en-US" dirty="0"/>
+          </a:p>
+        </p:txBody>
+      </p:sp>
+      <p:sp>
+        <p:nvSpPr>
+          <p:cNvPr id="10" name="TextBox 9">
+            <a:extLst>
+              <a:ext uri="{FF2B5EF4-FFF2-40B4-BE49-F238E27FC236}">
+                <a16:creationId xmlns:a16="http://schemas.microsoft.com/office/drawing/2014/main" id="{D66A051B-1499-4A3A-9683-B0E9CD4C4AD3}"/>
+              </a:ext>
+            </a:extLst>
+          </p:cNvPr>
+          <p:cNvSpPr txBox="1"/>
+          <p:nvPr/>
+        </p:nvSpPr>
+        <p:spPr>
+          <a:xfrm>
+            <a:off x="2412023" y="169835"/>
+            <a:ext cx="7367951" cy="523220"/>
+          </a:xfrm>
+          <a:prstGeom prst="rect">
+            <a:avLst/>
+          </a:prstGeom>
+          <a:noFill/>
+        </p:spPr>
+        <p:txBody>
+          <a:bodyPr wrap="square" rtlCol="0">
+            <a:spAutoFit/>
+          </a:bodyPr>
+          <a:lstStyle/>
+          <a:p>
+            <a:r>
+              <a:rPr lang="en-US" sz="2800" dirty="0">
+                <a:latin typeface="+mj-lt"/>
+              </a:rPr>
+              <a:t>Differing particle speed while passing by two wires</a:t>
+            </a:r>
+          </a:p>
+        </p:txBody>
+      </p:sp>
+    </p:spTree>
+    <p:extLst>
+      <p:ext uri="{BB962C8B-B14F-4D97-AF65-F5344CB8AC3E}">
+        <p14:creationId xmlns:p14="http://schemas.microsoft.com/office/powerpoint/2010/main" val="2488020001"/>
+      </p:ext>
+    </p:extLst>
+  </p:cSld>
+  <p:clrMapOvr>
+    <a:masterClrMapping/>
+  </p:clrMapOvr>
+</p:sld>
+</file>
+
+<file path=ppt/slides/slide8.xml><?xml version="1.0" encoding="utf-8"?>
+<p:sld xmlns:a="http://schemas.openxmlformats.org/drawingml/2006/main" xmlns:r="http://schemas.openxmlformats.org/officeDocument/2006/relationships" xmlns:p="http://schemas.openxmlformats.org/presentationml/2006/main">
+  <p:cSld>
+    <p:spTree>
+      <p:nvGrpSpPr>
+        <p:cNvPr id="1" name=""/>
+        <p:cNvGrpSpPr/>
+        <p:nvPr/>
+      </p:nvGrpSpPr>
+      <p:grpSpPr>
+        <a:xfrm>
+          <a:off x="0" y="0"/>
+          <a:ext cx="0" cy="0"/>
+          <a:chOff x="0" y="0"/>
+          <a:chExt cx="0" cy="0"/>
+        </a:xfrm>
+      </p:grpSpPr>
+      <p:sp>
+        <p:nvSpPr>
+          <p:cNvPr id="2" name="Title 1">
+            <a:extLst>
+              <a:ext uri="{FF2B5EF4-FFF2-40B4-BE49-F238E27FC236}">
+                <a16:creationId xmlns:a16="http://schemas.microsoft.com/office/drawing/2014/main" id="{9B05D54C-4C91-416C-B7F4-916B8A99202A}"/>
+              </a:ext>
+            </a:extLst>
+          </p:cNvPr>
+          <p:cNvSpPr>
+            <a:spLocks noGrp="1"/>
+          </p:cNvSpPr>
+          <p:nvPr>
+            <p:ph type="title"/>
+          </p:nvPr>
+        </p:nvSpPr>
+        <p:spPr/>
+        <p:txBody>
+          <a:bodyPr>
+            <a:normAutofit/>
+          </a:bodyPr>
+          <a:lstStyle/>
+          <a:p>
+            <a:r>
+              <a:rPr lang="en-US" sz="3200" dirty="0"/>
+              <a:t>Challenges with </a:t>
+            </a:r>
+            <a:r>
+              <a:rPr lang="en-US" sz="3200" dirty="0" err="1"/>
+              <a:t>Metglas</a:t>
+            </a:r>
+            <a:endParaRPr lang="en-US" sz="3200" dirty="0"/>
+          </a:p>
+        </p:txBody>
+      </p:sp>
+      <p:sp>
+        <p:nvSpPr>
+          <p:cNvPr id="3" name="Content Placeholder 2">
+            <a:extLst>
+              <a:ext uri="{FF2B5EF4-FFF2-40B4-BE49-F238E27FC236}">
+                <a16:creationId xmlns:a16="http://schemas.microsoft.com/office/drawing/2014/main" id="{2E6345FB-0132-4D82-B161-0B2EBEBA97CA}"/>
+              </a:ext>
+            </a:extLst>
+          </p:cNvPr>
+          <p:cNvSpPr>
+            <a:spLocks noGrp="1"/>
+          </p:cNvSpPr>
+          <p:nvPr>
+            <p:ph idx="1"/>
+          </p:nvPr>
+        </p:nvSpPr>
+        <p:spPr>
+          <a:xfrm>
+            <a:off x="838200" y="1847850"/>
+            <a:ext cx="10515600" cy="4351338"/>
+          </a:xfrm>
+        </p:spPr>
+        <p:txBody>
+          <a:bodyPr>
+            <a:normAutofit lnSpcReduction="10000"/>
+          </a:bodyPr>
+          <a:lstStyle/>
+          <a:p>
+            <a:r>
+              <a:rPr lang="en-US" dirty="0"/>
+              <a:t>Much, much stronger field (0.5 T) compared to other components of the experiment (which are on the order of </a:t>
+            </a:r>
+            <a:r>
+              <a:rPr lang="en-US" dirty="0" err="1"/>
+              <a:t>microtesla</a:t>
+            </a:r>
+            <a:r>
+              <a:rPr lang="en-US" dirty="0"/>
+              <a:t>)</a:t>
+            </a:r>
+          </a:p>
+          <a:p>
+            <a:r>
+              <a:rPr lang="en-US" dirty="0"/>
+              <a:t>Strong field coupled with neutron magnetic moment results in many, many oscillations inside the material</a:t>
+            </a:r>
+          </a:p>
+          <a:p>
+            <a:r>
+              <a:rPr lang="en-US" dirty="0"/>
+              <a:t>Very thin material (0.1 mm)</a:t>
+            </a:r>
+          </a:p>
+          <a:p>
+            <a:r>
+              <a:rPr lang="en-US" dirty="0"/>
+              <a:t>Must adjust the solver accordingly (very small time steps, small tolerances) in order to properly evolve the system (maintain normalization and “see” every domain)</a:t>
+            </a:r>
+          </a:p>
+          <a:p>
+            <a:r>
+              <a:rPr lang="en-US" dirty="0"/>
+              <a:t>Difficult to model exactly – domains can have varying sizes and random magnetic field orientations depending on the saturation</a:t>
+            </a:r>
+          </a:p>
+          <a:p>
+            <a:endParaRPr lang="en-US" dirty="0"/>
+          </a:p>
+        </p:txBody>
+      </p:sp>
+      <p:sp>
+        <p:nvSpPr>
+          <p:cNvPr id="4" name="Footer Placeholder 3">
+            <a:extLst>
+              <a:ext uri="{FF2B5EF4-FFF2-40B4-BE49-F238E27FC236}">
+                <a16:creationId xmlns:a16="http://schemas.microsoft.com/office/drawing/2014/main" id="{5AC5F585-ED27-4757-ADE0-0DEF69F4F1B2}"/>
+              </a:ext>
+            </a:extLst>
+          </p:cNvPr>
+          <p:cNvSpPr>
+            <a:spLocks noGrp="1"/>
+          </p:cNvSpPr>
+          <p:nvPr>
+            <p:ph type="ftr" sz="quarter" idx="11"/>
+          </p:nvPr>
+        </p:nvSpPr>
+        <p:spPr/>
+        <p:txBody>
+          <a:bodyPr/>
+          <a:lstStyle/>
+          <a:p>
+            <a:r>
+              <a:rPr lang="en-US"/>
+              <a:t>https://github.com/erfz/pt-experiment</a:t>
+            </a:r>
+          </a:p>
+        </p:txBody>
+      </p:sp>
+      <p:sp>
+        <p:nvSpPr>
+          <p:cNvPr id="5" name="Slide Number Placeholder 4">
+            <a:extLst>
+              <a:ext uri="{FF2B5EF4-FFF2-40B4-BE49-F238E27FC236}">
+                <a16:creationId xmlns:a16="http://schemas.microsoft.com/office/drawing/2014/main" id="{182D98CE-631D-479B-B5AD-C707C3844AD6}"/>
+              </a:ext>
+            </a:extLst>
+          </p:cNvPr>
+          <p:cNvSpPr>
+            <a:spLocks noGrp="1"/>
+          </p:cNvSpPr>
+          <p:nvPr>
+            <p:ph type="sldNum" sz="quarter" idx="12"/>
+          </p:nvPr>
+        </p:nvSpPr>
+        <p:spPr/>
+        <p:txBody>
+          <a:bodyPr/>
+          <a:lstStyle/>
+          <a:p>
+            <a:fld id="{92B06790-5D7A-46E6-89FE-8F323915C98E}" type="slidenum">
+              <a:rPr lang="en-US" smtClean="0"/>
+              <a:t>8</a:t>
+            </a:fld>
+            <a:endParaRPr lang="en-US"/>
+          </a:p>
+        </p:txBody>
+      </p:sp>
+    </p:spTree>
+    <p:extLst>
+      <p:ext uri="{BB962C8B-B14F-4D97-AF65-F5344CB8AC3E}">
+        <p14:creationId xmlns:p14="http://schemas.microsoft.com/office/powerpoint/2010/main" val="1270832340"/>
+      </p:ext>
+    </p:extLst>
+  </p:cSld>
+  <p:clrMapOvr>
+    <a:masterClrMapping/>
+  </p:clrMapOvr>
+</p:sld>
+</file>
+
+<file path=ppt/slides/slide9.xml><?xml version="1.0" encoding="utf-8"?>
+<p:sld xmlns:a="http://schemas.openxmlformats.org/drawingml/2006/main" xmlns:r="http://schemas.openxmlformats.org/officeDocument/2006/relationships" xmlns:p="http://schemas.openxmlformats.org/presentationml/2006/main">
+  <p:cSld>
+    <p:spTree>
+      <p:nvGrpSpPr>
+        <p:cNvPr id="1" name=""/>
+        <p:cNvGrpSpPr/>
+        <p:nvPr/>
+      </p:nvGrpSpPr>
+      <p:grpSpPr>
+        <a:xfrm>
+          <a:off x="0" y="0"/>
+          <a:ext cx="0" cy="0"/>
+          <a:chOff x="0" y="0"/>
+          <a:chExt cx="0" cy="0"/>
+        </a:xfrm>
+      </p:grpSpPr>
+      <p:pic>
+        <p:nvPicPr>
+          <p:cNvPr id="5" name="Graphic 4">
+            <a:extLst>
+              <a:ext uri="{FF2B5EF4-FFF2-40B4-BE49-F238E27FC236}">
+                <a16:creationId xmlns:a16="http://schemas.microsoft.com/office/drawing/2014/main" id="{02FB9825-4CF6-41C6-9EE2-CB7BC38C9970}"/>
               </a:ext>
             </a:extLst>
           </p:cNvPr>
@@ -5319,8 +7102,8 @@
         </p:blipFill>
         <p:spPr>
           <a:xfrm>
-            <a:off x="6096000" y="1574883"/>
-            <a:ext cx="5557999" cy="3777281"/>
+            <a:off x="2930174" y="815413"/>
+            <a:ext cx="6331647" cy="4149956"/>
           </a:xfrm>
           <a:prstGeom prst="rect">
             <a:avLst/>
@@ -5329,10 +7112,10 @@
       </p:pic>
       <p:sp>
         <p:nvSpPr>
-          <p:cNvPr id="9" name="TextBox 8">
-            <a:extLst>
-              <a:ext uri="{FF2B5EF4-FFF2-40B4-BE49-F238E27FC236}">
-                <a16:creationId xmlns:a16="http://schemas.microsoft.com/office/drawing/2014/main" id="{5E7690CD-CE62-488F-9F92-41CDBD61C79E}"/>
+          <p:cNvPr id="6" name="TextBox 5">
+            <a:extLst>
+              <a:ext uri="{FF2B5EF4-FFF2-40B4-BE49-F238E27FC236}">
+                <a16:creationId xmlns:a16="http://schemas.microsoft.com/office/drawing/2014/main" id="{5C2FC86C-A87F-4A4D-B43D-74692C548139}"/>
               </a:ext>
             </a:extLst>
           </p:cNvPr>
@@ -5341,8 +7124,8 @@
         </p:nvSpPr>
         <p:spPr>
           <a:xfrm>
-            <a:off x="2676877" y="5632005"/>
-            <a:ext cx="6838245" cy="369332"/>
+            <a:off x="3085182" y="4965369"/>
+            <a:ext cx="6936035" cy="1815882"/>
           </a:xfrm>
           <a:prstGeom prst="rect">
             <a:avLst/>
@@ -5356,35 +7139,104 @@
           <a:lstStyle/>
           <a:p>
             <a:r>
+              <a:rPr lang="en-US" sz="1600" dirty="0"/>
+              <a:t>Final spin: [0.9929377240255438, -0.09402723622844013, -0.072357613056144]</a:t>
+            </a:r>
+          </a:p>
+          <a:p>
+            <a:r>
+              <a:rPr lang="en-US" sz="1600" dirty="0" err="1"/>
+              <a:t>Metglas</a:t>
+            </a:r>
+            <a:r>
+              <a:rPr lang="en-US" sz="1600" dirty="0"/>
+              <a:t> domain field strength: 0.5 T</a:t>
+            </a:r>
+          </a:p>
+          <a:p>
+            <a:r>
+              <a:rPr lang="en-US" sz="1600" dirty="0"/>
+              <a:t>Domain dimensions: 10 </a:t>
+            </a:r>
+            <a:r>
+              <a:rPr lang="el-GR" sz="1600" dirty="0"/>
+              <a:t>μ</a:t>
+            </a:r>
+            <a:r>
+              <a:rPr lang="en-US" sz="1600" dirty="0"/>
+              <a:t>m x 10 </a:t>
+            </a:r>
+            <a:r>
+              <a:rPr lang="el-GR" sz="1600" dirty="0"/>
+              <a:t>μ</a:t>
+            </a:r>
+            <a:r>
+              <a:rPr lang="en-US" sz="1600" dirty="0"/>
+              <a:t>m</a:t>
+            </a:r>
+          </a:p>
+          <a:p>
+            <a:r>
+              <a:rPr lang="en-US" sz="1600" dirty="0"/>
+              <a:t>Speed: 100 m/s</a:t>
+            </a:r>
+          </a:p>
+          <a:p>
+            <a:r>
+              <a:rPr lang="en-US" sz="1600" dirty="0"/>
+              <a:t>Saturation: 0.82</a:t>
+            </a:r>
+          </a:p>
+          <a:p>
+            <a:r>
+              <a:rPr lang="en-US" sz="1600" dirty="0" err="1"/>
+              <a:t>Metglas</a:t>
+            </a:r>
+            <a:r>
+              <a:rPr lang="en-US" sz="1600" dirty="0"/>
+              <a:t> length: 0.1 mm</a:t>
+            </a:r>
+          </a:p>
+          <a:p>
+            <a:r>
+              <a:rPr lang="en-US" sz="1600" dirty="0" err="1"/>
+              <a:t>Metglas</a:t>
+            </a:r>
+            <a:r>
+              <a:rPr lang="en-US" sz="1600" dirty="0"/>
+              <a:t> width: 0.1 m</a:t>
+            </a:r>
+          </a:p>
+        </p:txBody>
+      </p:sp>
+      <p:sp>
+        <p:nvSpPr>
+          <p:cNvPr id="9" name="Footer Placeholder 8">
+            <a:extLst>
+              <a:ext uri="{FF2B5EF4-FFF2-40B4-BE49-F238E27FC236}">
+                <a16:creationId xmlns:a16="http://schemas.microsoft.com/office/drawing/2014/main" id="{333C9108-14DD-4574-B595-31E7CDE371E2}"/>
+              </a:ext>
+            </a:extLst>
+          </p:cNvPr>
+          <p:cNvSpPr>
+            <a:spLocks noGrp="1"/>
+          </p:cNvSpPr>
+          <p:nvPr>
+            <p:ph type="ftr" sz="quarter" idx="11"/>
+          </p:nvPr>
+        </p:nvSpPr>
+        <p:spPr>
+          <a:xfrm>
+            <a:off x="6553200" y="6345389"/>
+            <a:ext cx="4114800" cy="365125"/>
+          </a:xfrm>
+        </p:spPr>
+        <p:txBody>
+          <a:bodyPr/>
+          <a:lstStyle/>
+          <a:p>
+            <a:r>
               <a:rPr lang="en-US" dirty="0"/>
-              <a:t>Number of domains passed thru per particle = [1, 2, 5, 8, 10, 12, 15, 20]</a:t>
-            </a:r>
-          </a:p>
-        </p:txBody>
-      </p:sp>
-      <p:sp>
-        <p:nvSpPr>
-          <p:cNvPr id="12" name="Footer Placeholder 11">
-            <a:extLst>
-              <a:ext uri="{FF2B5EF4-FFF2-40B4-BE49-F238E27FC236}">
-                <a16:creationId xmlns:a16="http://schemas.microsoft.com/office/drawing/2014/main" id="{F8BE2007-8430-467A-93CA-6BD318936ACD}"/>
-              </a:ext>
-            </a:extLst>
-          </p:cNvPr>
-          <p:cNvSpPr>
-            <a:spLocks noGrp="1"/>
-          </p:cNvSpPr>
-          <p:nvPr>
-            <p:ph type="ftr" sz="quarter" idx="11"/>
-          </p:nvPr>
-        </p:nvSpPr>
-        <p:spPr/>
-        <p:txBody>
-          <a:bodyPr/>
-          <a:lstStyle/>
-          <a:p>
-            <a:r>
-              <a:rPr lang="en-US"/>
               <a:t>https://github.com/erfz/pt-experiment</a:t>
             </a:r>
           </a:p>
@@ -5392,10 +7244,10 @@
       </p:sp>
       <p:sp>
         <p:nvSpPr>
-          <p:cNvPr id="13" name="Slide Number Placeholder 12">
-            <a:extLst>
-              <a:ext uri="{FF2B5EF4-FFF2-40B4-BE49-F238E27FC236}">
-                <a16:creationId xmlns:a16="http://schemas.microsoft.com/office/drawing/2014/main" id="{9983AB45-1A6F-47C4-803A-0B4BBF058363}"/>
+          <p:cNvPr id="10" name="Slide Number Placeholder 9">
+            <a:extLst>
+              <a:ext uri="{FF2B5EF4-FFF2-40B4-BE49-F238E27FC236}">
+                <a16:creationId xmlns:a16="http://schemas.microsoft.com/office/drawing/2014/main" id="{003444D9-FEC8-4B41-90D7-4096F671E213}"/>
               </a:ext>
             </a:extLst>
           </p:cNvPr>
@@ -5413,16 +7265,62 @@
           <a:p>
             <a:fld id="{92B06790-5D7A-46E6-89FE-8F323915C98E}" type="slidenum">
               <a:rPr lang="en-US" smtClean="0"/>
-              <a:t>7</a:t>
+              <a:t>9</a:t>
             </a:fld>
             <a:endParaRPr lang="en-US"/>
+          </a:p>
+        </p:txBody>
+      </p:sp>
+      <p:sp>
+        <p:nvSpPr>
+          <p:cNvPr id="7" name="TextBox 6">
+            <a:extLst>
+              <a:ext uri="{FF2B5EF4-FFF2-40B4-BE49-F238E27FC236}">
+                <a16:creationId xmlns:a16="http://schemas.microsoft.com/office/drawing/2014/main" id="{8FD75CF8-2F71-4CC0-A22B-0E780312214A}"/>
+              </a:ext>
+            </a:extLst>
+          </p:cNvPr>
+          <p:cNvSpPr txBox="1"/>
+          <p:nvPr/>
+        </p:nvSpPr>
+        <p:spPr>
+          <a:xfrm>
+            <a:off x="4078748" y="173854"/>
+            <a:ext cx="4034497" cy="523220"/>
+          </a:xfrm>
+          <a:prstGeom prst="rect">
+            <a:avLst/>
+          </a:prstGeom>
+          <a:noFill/>
+        </p:spPr>
+        <p:txBody>
+          <a:bodyPr wrap="square" rtlCol="0">
+            <a:spAutoFit/>
+          </a:bodyPr>
+          <a:lstStyle/>
+          <a:p>
+            <a:r>
+              <a:rPr lang="en-US" sz="2800" dirty="0">
+                <a:latin typeface="+mj-lt"/>
+              </a:rPr>
+              <a:t>Oscillations within </a:t>
+            </a:r>
+            <a:r>
+              <a:rPr lang="en-US" sz="2800" dirty="0" err="1">
+                <a:latin typeface="+mj-lt"/>
+              </a:rPr>
+              <a:t>Metglas</a:t>
+            </a:r>
+            <a:endParaRPr lang="en-US" sz="2800" dirty="0">
+              <a:latin typeface="+mj-lt"/>
+            </a:endParaRPr>
           </a:p>
         </p:txBody>
       </p:sp>
     </p:spTree>
     <p:extLst>
       <p:ext uri="{BB962C8B-B14F-4D97-AF65-F5344CB8AC3E}">
-        <p14:creationId xmlns:p14="http://schemas.microsoft.com/office/powerpoint/2010/main" val="2495429277"/>
+        <p14:creationId xmlns:p14="http://schemas.microsoft.com/office/powerpoint/2010/main" val="3960618021"/>
       </p:ext>
     </p:extLst>
   </p:cSld>

</xml_diff>